<commit_message>
Added addition to the language
</commit_message>
<xml_diff>
--- a/presentation/Nox - Introduction.pptx
+++ b/presentation/Nox - Introduction.pptx
@@ -6,7 +6,7 @@
     <p:sldMasterId id="2147483852" r:id="rId2"/>
   </p:sldMasterIdLst>
   <p:notesMasterIdLst>
-    <p:notesMasterId r:id="rId14"/>
+    <p:notesMasterId r:id="rId15"/>
   </p:notesMasterIdLst>
   <p:sldIdLst>
     <p:sldId id="256" r:id="rId3"/>
@@ -20,6 +20,7 @@
     <p:sldId id="263" r:id="rId11"/>
     <p:sldId id="264" r:id="rId12"/>
     <p:sldId id="265" r:id="rId13"/>
+    <p:sldId id="268" r:id="rId14"/>
   </p:sldIdLst>
   <p:sldSz cx="12192000" cy="6858000"/>
   <p:notesSz cx="6858000" cy="9144000"/>
@@ -252,6 +253,11 @@
       </a:defRPr>
     </a:lvl9pPr>
   </p:defaultTextStyle>
+  <p:extLst>
+    <p:ext uri="{EFAFB233-063F-42B5-8137-9DF3F51BA10A}">
+      <p15:sldGuideLst xmlns:p15="http://schemas.microsoft.com/office/powerpoint/2012/main"/>
+    </p:ext>
+  </p:extLst>
 </p:presentation>
 </file>
 
@@ -337,7 +343,7 @@
           <a:p>
             <a:fld id="{502044A8-6BC1-EF43-8772-8FB4293FFAAE}" type="datetimeFigureOut">
               <a:rPr lang="en-SE" smtClean="0"/>
-              <a:t>2023-11-03</a:t>
+              <a:t>2023-11-04</a:t>
             </a:fld>
             <a:endParaRPr lang="en-SE"/>
           </a:p>
@@ -848,6 +854,90 @@
     <p:extLst>
       <p:ext uri="{BB962C8B-B14F-4D97-AF65-F5344CB8AC3E}">
         <p14:creationId xmlns:p14="http://schemas.microsoft.com/office/powerpoint/2010/main" val="2497215828"/>
+      </p:ext>
+    </p:extLst>
+  </p:cSld>
+  <p:clrMapOvr>
+    <a:masterClrMapping/>
+  </p:clrMapOvr>
+</p:notes>
+</file>
+
+<file path=ppt/notesSlides/notesSlide12.xml><?xml version="1.0" encoding="utf-8"?>
+<p:notes xmlns:a="http://schemas.openxmlformats.org/drawingml/2006/main" xmlns:r="http://schemas.openxmlformats.org/officeDocument/2006/relationships" xmlns:p="http://schemas.openxmlformats.org/presentationml/2006/main">
+  <p:cSld>
+    <p:spTree>
+      <p:nvGrpSpPr>
+        <p:cNvPr id="1" name=""/>
+        <p:cNvGrpSpPr/>
+        <p:nvPr/>
+      </p:nvGrpSpPr>
+      <p:grpSpPr>
+        <a:xfrm>
+          <a:off x="0" y="0"/>
+          <a:ext cx="0" cy="0"/>
+          <a:chOff x="0" y="0"/>
+          <a:chExt cx="0" cy="0"/>
+        </a:xfrm>
+      </p:grpSpPr>
+      <p:sp>
+        <p:nvSpPr>
+          <p:cNvPr id="2" name="Slide Image Placeholder 1"/>
+          <p:cNvSpPr>
+            <a:spLocks noGrp="1" noRot="1" noChangeAspect="1"/>
+          </p:cNvSpPr>
+          <p:nvPr>
+            <p:ph type="sldImg"/>
+          </p:nvPr>
+        </p:nvSpPr>
+        <p:spPr/>
+      </p:sp>
+      <p:sp>
+        <p:nvSpPr>
+          <p:cNvPr id="3" name="Notes Placeholder 2"/>
+          <p:cNvSpPr>
+            <a:spLocks noGrp="1"/>
+          </p:cNvSpPr>
+          <p:nvPr>
+            <p:ph type="body" idx="1"/>
+          </p:nvPr>
+        </p:nvSpPr>
+        <p:spPr/>
+        <p:txBody>
+          <a:bodyPr/>
+          <a:lstStyle/>
+          <a:p>
+            <a:endParaRPr lang="en-SE" dirty="0"/>
+          </a:p>
+        </p:txBody>
+      </p:sp>
+      <p:sp>
+        <p:nvSpPr>
+          <p:cNvPr id="4" name="Slide Number Placeholder 3"/>
+          <p:cNvSpPr>
+            <a:spLocks noGrp="1"/>
+          </p:cNvSpPr>
+          <p:nvPr>
+            <p:ph type="sldNum" sz="quarter" idx="5"/>
+          </p:nvPr>
+        </p:nvSpPr>
+        <p:spPr/>
+        <p:txBody>
+          <a:bodyPr/>
+          <a:lstStyle/>
+          <a:p>
+            <a:fld id="{4593B2ED-0E29-1445-9605-A112F59A64AB}" type="slidenum">
+              <a:rPr lang="en-SE" smtClean="0"/>
+              <a:t>12</a:t>
+            </a:fld>
+            <a:endParaRPr lang="en-SE"/>
+          </a:p>
+        </p:txBody>
+      </p:sp>
+    </p:spTree>
+    <p:extLst>
+      <p:ext uri="{BB962C8B-B14F-4D97-AF65-F5344CB8AC3E}">
+        <p14:creationId xmlns:p14="http://schemas.microsoft.com/office/powerpoint/2010/main" val="4218834352"/>
       </p:ext>
     </p:extLst>
   </p:cSld>
@@ -10562,13 +10652,13 @@
   <p:clrMapOvr>
     <a:masterClrMapping/>
   </p:clrMapOvr>
-  <mc:AlternateContent xmlns:mc="http://schemas.openxmlformats.org/markup-compatibility/2006">
-    <mc:Choice xmlns:p159="http://schemas.microsoft.com/office/powerpoint/2015/09/main" Requires="p159">
+  <mc:AlternateContent xmlns:mc="http://schemas.openxmlformats.org/markup-compatibility/2006" xmlns:p159="http://schemas.microsoft.com/office/powerpoint/2015/09/main">
+    <mc:Choice Requires="p159">
       <p:transition xmlns:p14="http://schemas.microsoft.com/office/powerpoint/2010/main" spd="slow" p14:dur="2000">
         <p159:morph option="byObject"/>
       </p:transition>
     </mc:Choice>
-    <mc:Fallback>
+    <mc:Fallback xmlns="">
       <p:transition spd="slow">
         <p:fade/>
       </p:transition>
@@ -13153,13 +13243,1297 @@
   <p:clrMapOvr>
     <a:masterClrMapping/>
   </p:clrMapOvr>
-  <mc:AlternateContent xmlns:mc="http://schemas.openxmlformats.org/markup-compatibility/2006">
-    <mc:Choice xmlns:p159="http://schemas.microsoft.com/office/powerpoint/2015/09/main" Requires="p159">
+  <mc:AlternateContent xmlns:mc="http://schemas.openxmlformats.org/markup-compatibility/2006" xmlns:p159="http://schemas.microsoft.com/office/powerpoint/2015/09/main">
+    <mc:Choice Requires="p159">
       <p:transition xmlns:p14="http://schemas.microsoft.com/office/powerpoint/2010/main" spd="slow" p14:dur="2000">
         <p159:morph option="byObject"/>
       </p:transition>
     </mc:Choice>
-    <mc:Fallback>
+    <mc:Fallback xmlns="">
+      <p:transition spd="slow">
+        <p:fade/>
+      </p:transition>
+    </mc:Fallback>
+  </mc:AlternateContent>
+</p:sld>
+</file>
+
+<file path=ppt/slides/slide12.xml><?xml version="1.0" encoding="utf-8"?>
+<p:sld xmlns:a="http://schemas.openxmlformats.org/drawingml/2006/main" xmlns:r="http://schemas.openxmlformats.org/officeDocument/2006/relationships" xmlns:p="http://schemas.openxmlformats.org/presentationml/2006/main">
+  <p:cSld>
+    <p:spTree>
+      <p:nvGrpSpPr>
+        <p:cNvPr id="1" name=""/>
+        <p:cNvGrpSpPr/>
+        <p:nvPr/>
+      </p:nvGrpSpPr>
+      <p:grpSpPr>
+        <a:xfrm>
+          <a:off x="0" y="0"/>
+          <a:ext cx="0" cy="0"/>
+          <a:chOff x="0" y="0"/>
+          <a:chExt cx="0" cy="0"/>
+        </a:xfrm>
+      </p:grpSpPr>
+      <p:sp>
+        <p:nvSpPr>
+          <p:cNvPr id="131" name="Title 130">
+            <a:extLst>
+              <a:ext uri="{FF2B5EF4-FFF2-40B4-BE49-F238E27FC236}">
+                <a16:creationId xmlns:a16="http://schemas.microsoft.com/office/drawing/2014/main" id="{509C51DA-9F55-CBF6-A79B-C1DBC4A2981A}"/>
+              </a:ext>
+            </a:extLst>
+          </p:cNvPr>
+          <p:cNvSpPr>
+            <a:spLocks noGrp="1"/>
+          </p:cNvSpPr>
+          <p:nvPr>
+            <p:ph type="title"/>
+          </p:nvPr>
+        </p:nvSpPr>
+        <p:spPr>
+          <a:xfrm>
+            <a:off x="1040000" y="67874"/>
+            <a:ext cx="10272000" cy="768000"/>
+          </a:xfrm>
+        </p:spPr>
+        <p:txBody>
+          <a:bodyPr/>
+          <a:lstStyle/>
+          <a:p>
+            <a:pPr algn="ctr"/>
+            <a:r>
+              <a:rPr lang="en-SE" sz="4000" b="1" dirty="0"/>
+              <a:t>Episode 1</a:t>
+            </a:r>
+          </a:p>
+        </p:txBody>
+      </p:sp>
+      <p:sp>
+        <p:nvSpPr>
+          <p:cNvPr id="10" name="Title 46">
+            <a:extLst>
+              <a:ext uri="{FF2B5EF4-FFF2-40B4-BE49-F238E27FC236}">
+                <a16:creationId xmlns:a16="http://schemas.microsoft.com/office/drawing/2014/main" id="{155FCCF3-9020-7B5F-6D9A-984AFADE8492}"/>
+              </a:ext>
+            </a:extLst>
+          </p:cNvPr>
+          <p:cNvSpPr txBox="1">
+            <a:spLocks/>
+          </p:cNvSpPr>
+          <p:nvPr/>
+        </p:nvSpPr>
+        <p:spPr>
+          <a:xfrm>
+            <a:off x="643468" y="1111599"/>
+            <a:ext cx="11159067" cy="1343734"/>
+          </a:xfrm>
+          <a:prstGeom prst="rect">
+            <a:avLst/>
+          </a:prstGeom>
+          <a:noFill/>
+          <a:ln>
+            <a:noFill/>
+          </a:ln>
+        </p:spPr>
+        <p:txBody>
+          <a:bodyPr spcFirstLastPara="1" wrap="square" lIns="91425" tIns="91425" rIns="91425" bIns="91425" anchor="ctr" anchorCtr="0">
+            <a:noAutofit/>
+          </a:bodyPr>
+          <a:lstStyle>
+            <a:defPPr marR="0" lvl="0" algn="l" rtl="0">
+              <a:lnSpc>
+                <a:spcPct val="100000"/>
+              </a:lnSpc>
+              <a:spcBef>
+                <a:spcPts val="0"/>
+              </a:spcBef>
+              <a:spcAft>
+                <a:spcPts val="0"/>
+              </a:spcAft>
+            </a:defPPr>
+            <a:lvl1pPr marR="0" lvl="0" algn="l" rtl="0" eaLnBrk="1" hangingPunct="1">
+              <a:lnSpc>
+                <a:spcPct val="100000"/>
+              </a:lnSpc>
+              <a:spcBef>
+                <a:spcPts val="0"/>
+              </a:spcBef>
+              <a:spcAft>
+                <a:spcPts val="0"/>
+              </a:spcAft>
+              <a:buClr>
+                <a:schemeClr val="dk1"/>
+              </a:buClr>
+              <a:buSzPts val="3300"/>
+              <a:buFont typeface="Quantico"/>
+              <a:buNone/>
+              <a:defRPr sz="3300" b="0" i="0" u="none" strike="noStrike" cap="none">
+                <a:solidFill>
+                  <a:schemeClr val="dk1"/>
+                </a:solidFill>
+                <a:latin typeface="Quantico"/>
+                <a:ea typeface="Quantico"/>
+                <a:cs typeface="Quantico"/>
+                <a:sym typeface="Quantico"/>
+              </a:defRPr>
+            </a:lvl1pPr>
+            <a:lvl2pPr marR="0" lvl="1" algn="l" rtl="0" eaLnBrk="1" hangingPunct="1">
+              <a:lnSpc>
+                <a:spcPct val="100000"/>
+              </a:lnSpc>
+              <a:spcBef>
+                <a:spcPts val="0"/>
+              </a:spcBef>
+              <a:spcAft>
+                <a:spcPts val="0"/>
+              </a:spcAft>
+              <a:buClr>
+                <a:schemeClr val="dk1"/>
+              </a:buClr>
+              <a:buSzPts val="3300"/>
+              <a:buFont typeface="Quantico"/>
+              <a:buNone/>
+              <a:defRPr sz="3300" b="1" i="0" u="none" strike="noStrike" cap="none">
+                <a:solidFill>
+                  <a:schemeClr val="dk1"/>
+                </a:solidFill>
+                <a:latin typeface="Quantico"/>
+                <a:ea typeface="Quantico"/>
+                <a:cs typeface="Quantico"/>
+                <a:sym typeface="Quantico"/>
+              </a:defRPr>
+            </a:lvl2pPr>
+            <a:lvl3pPr marR="0" lvl="2" algn="l" rtl="0" eaLnBrk="1" hangingPunct="1">
+              <a:lnSpc>
+                <a:spcPct val="100000"/>
+              </a:lnSpc>
+              <a:spcBef>
+                <a:spcPts val="0"/>
+              </a:spcBef>
+              <a:spcAft>
+                <a:spcPts val="0"/>
+              </a:spcAft>
+              <a:buClr>
+                <a:schemeClr val="dk1"/>
+              </a:buClr>
+              <a:buSzPts val="3300"/>
+              <a:buFont typeface="Quantico"/>
+              <a:buNone/>
+              <a:defRPr sz="3300" b="1" i="0" u="none" strike="noStrike" cap="none">
+                <a:solidFill>
+                  <a:schemeClr val="dk1"/>
+                </a:solidFill>
+                <a:latin typeface="Quantico"/>
+                <a:ea typeface="Quantico"/>
+                <a:cs typeface="Quantico"/>
+                <a:sym typeface="Quantico"/>
+              </a:defRPr>
+            </a:lvl3pPr>
+            <a:lvl4pPr marR="0" lvl="3" algn="l" rtl="0" eaLnBrk="1" hangingPunct="1">
+              <a:lnSpc>
+                <a:spcPct val="100000"/>
+              </a:lnSpc>
+              <a:spcBef>
+                <a:spcPts val="0"/>
+              </a:spcBef>
+              <a:spcAft>
+                <a:spcPts val="0"/>
+              </a:spcAft>
+              <a:buClr>
+                <a:schemeClr val="dk1"/>
+              </a:buClr>
+              <a:buSzPts val="3300"/>
+              <a:buFont typeface="Quantico"/>
+              <a:buNone/>
+              <a:defRPr sz="3300" b="1" i="0" u="none" strike="noStrike" cap="none">
+                <a:solidFill>
+                  <a:schemeClr val="dk1"/>
+                </a:solidFill>
+                <a:latin typeface="Quantico"/>
+                <a:ea typeface="Quantico"/>
+                <a:cs typeface="Quantico"/>
+                <a:sym typeface="Quantico"/>
+              </a:defRPr>
+            </a:lvl4pPr>
+            <a:lvl5pPr marR="0" lvl="4" algn="l" rtl="0" eaLnBrk="1" hangingPunct="1">
+              <a:lnSpc>
+                <a:spcPct val="100000"/>
+              </a:lnSpc>
+              <a:spcBef>
+                <a:spcPts val="0"/>
+              </a:spcBef>
+              <a:spcAft>
+                <a:spcPts val="0"/>
+              </a:spcAft>
+              <a:buClr>
+                <a:schemeClr val="dk1"/>
+              </a:buClr>
+              <a:buSzPts val="3300"/>
+              <a:buFont typeface="Quantico"/>
+              <a:buNone/>
+              <a:defRPr sz="3300" b="1" i="0" u="none" strike="noStrike" cap="none">
+                <a:solidFill>
+                  <a:schemeClr val="dk1"/>
+                </a:solidFill>
+                <a:latin typeface="Quantico"/>
+                <a:ea typeface="Quantico"/>
+                <a:cs typeface="Quantico"/>
+                <a:sym typeface="Quantico"/>
+              </a:defRPr>
+            </a:lvl5pPr>
+            <a:lvl6pPr marR="0" lvl="5" algn="l" rtl="0" eaLnBrk="1" hangingPunct="1">
+              <a:lnSpc>
+                <a:spcPct val="100000"/>
+              </a:lnSpc>
+              <a:spcBef>
+                <a:spcPts val="0"/>
+              </a:spcBef>
+              <a:spcAft>
+                <a:spcPts val="0"/>
+              </a:spcAft>
+              <a:buClr>
+                <a:schemeClr val="dk1"/>
+              </a:buClr>
+              <a:buSzPts val="3300"/>
+              <a:buFont typeface="Quantico"/>
+              <a:buNone/>
+              <a:defRPr sz="3300" b="1" i="0" u="none" strike="noStrike" cap="none">
+                <a:solidFill>
+                  <a:schemeClr val="dk1"/>
+                </a:solidFill>
+                <a:latin typeface="Quantico"/>
+                <a:ea typeface="Quantico"/>
+                <a:cs typeface="Quantico"/>
+                <a:sym typeface="Quantico"/>
+              </a:defRPr>
+            </a:lvl6pPr>
+            <a:lvl7pPr marR="0" lvl="6" algn="l" rtl="0" eaLnBrk="1" hangingPunct="1">
+              <a:lnSpc>
+                <a:spcPct val="100000"/>
+              </a:lnSpc>
+              <a:spcBef>
+                <a:spcPts val="0"/>
+              </a:spcBef>
+              <a:spcAft>
+                <a:spcPts val="0"/>
+              </a:spcAft>
+              <a:buClr>
+                <a:schemeClr val="dk1"/>
+              </a:buClr>
+              <a:buSzPts val="3300"/>
+              <a:buFont typeface="Quantico"/>
+              <a:buNone/>
+              <a:defRPr sz="3300" b="1" i="0" u="none" strike="noStrike" cap="none">
+                <a:solidFill>
+                  <a:schemeClr val="dk1"/>
+                </a:solidFill>
+                <a:latin typeface="Quantico"/>
+                <a:ea typeface="Quantico"/>
+                <a:cs typeface="Quantico"/>
+                <a:sym typeface="Quantico"/>
+              </a:defRPr>
+            </a:lvl7pPr>
+            <a:lvl8pPr marR="0" lvl="7" algn="l" rtl="0" eaLnBrk="1" hangingPunct="1">
+              <a:lnSpc>
+                <a:spcPct val="100000"/>
+              </a:lnSpc>
+              <a:spcBef>
+                <a:spcPts val="0"/>
+              </a:spcBef>
+              <a:spcAft>
+                <a:spcPts val="0"/>
+              </a:spcAft>
+              <a:buClr>
+                <a:schemeClr val="dk1"/>
+              </a:buClr>
+              <a:buSzPts val="3300"/>
+              <a:buFont typeface="Quantico"/>
+              <a:buNone/>
+              <a:defRPr sz="3300" b="1" i="0" u="none" strike="noStrike" cap="none">
+                <a:solidFill>
+                  <a:schemeClr val="dk1"/>
+                </a:solidFill>
+                <a:latin typeface="Quantico"/>
+                <a:ea typeface="Quantico"/>
+                <a:cs typeface="Quantico"/>
+                <a:sym typeface="Quantico"/>
+              </a:defRPr>
+            </a:lvl8pPr>
+            <a:lvl9pPr marR="0" lvl="8" algn="l" rtl="0" eaLnBrk="1" hangingPunct="1">
+              <a:lnSpc>
+                <a:spcPct val="100000"/>
+              </a:lnSpc>
+              <a:spcBef>
+                <a:spcPts val="0"/>
+              </a:spcBef>
+              <a:spcAft>
+                <a:spcPts val="0"/>
+              </a:spcAft>
+              <a:buClr>
+                <a:schemeClr val="dk1"/>
+              </a:buClr>
+              <a:buSzPts val="3300"/>
+              <a:buFont typeface="Quantico"/>
+              <a:buNone/>
+              <a:defRPr sz="3300" b="1" i="0" u="none" strike="noStrike" cap="none">
+                <a:solidFill>
+                  <a:schemeClr val="dk1"/>
+                </a:solidFill>
+                <a:latin typeface="Quantico"/>
+                <a:ea typeface="Quantico"/>
+                <a:cs typeface="Quantico"/>
+                <a:sym typeface="Quantico"/>
+              </a:defRPr>
+            </a:lvl9pPr>
+          </a:lstStyle>
+          <a:p>
+            <a:r>
+              <a:rPr lang="en-SE" dirty="0"/>
+              <a:t>Lets compile the most simplest program:</a:t>
+            </a:r>
+          </a:p>
+        </p:txBody>
+      </p:sp>
+      <p:graphicFrame>
+        <p:nvGraphicFramePr>
+          <p:cNvPr id="19" name="Table 18">
+            <a:extLst>
+              <a:ext uri="{FF2B5EF4-FFF2-40B4-BE49-F238E27FC236}">
+                <a16:creationId xmlns:a16="http://schemas.microsoft.com/office/drawing/2014/main" id="{5E9570C4-BFA8-405A-19AF-91563B17B0D9}"/>
+              </a:ext>
+            </a:extLst>
+          </p:cNvPr>
+          <p:cNvGraphicFramePr>
+            <a:graphicFrameLocks noGrp="1"/>
+          </p:cNvGraphicFramePr>
+          <p:nvPr>
+            <p:extLst>
+              <p:ext uri="{D42A27DB-BD31-4B8C-83A1-F6EECF244321}">
+                <p14:modId xmlns:p14="http://schemas.microsoft.com/office/powerpoint/2010/main" val="1863861735"/>
+              </p:ext>
+            </p:extLst>
+          </p:nvPr>
+        </p:nvGraphicFramePr>
+        <p:xfrm>
+          <a:off x="2586513" y="2455333"/>
+          <a:ext cx="7018973" cy="741680"/>
+        </p:xfrm>
+        <a:graphic>
+          <a:graphicData uri="http://schemas.openxmlformats.org/drawingml/2006/table">
+            <a:tbl>
+              <a:tblPr firstRow="1" bandRow="1"/>
+              <a:tblGrid>
+                <a:gridCol w="339419">
+                  <a:extLst>
+                    <a:ext uri="{9D8B030D-6E8A-4147-A177-3AD203B41FA5}">
+                      <a16:colId xmlns:a16="http://schemas.microsoft.com/office/drawing/2014/main" val="876392475"/>
+                    </a:ext>
+                  </a:extLst>
+                </a:gridCol>
+                <a:gridCol w="6679554">
+                  <a:extLst>
+                    <a:ext uri="{9D8B030D-6E8A-4147-A177-3AD203B41FA5}">
+                      <a16:colId xmlns:a16="http://schemas.microsoft.com/office/drawing/2014/main" val="4276942065"/>
+                    </a:ext>
+                  </a:extLst>
+                </a:gridCol>
+              </a:tblGrid>
+              <a:tr h="370840">
+                <a:tc>
+                  <a:txBody>
+                    <a:bodyPr/>
+                    <a:lstStyle/>
+                    <a:p>
+                      <a:pPr marL="0" marR="0" lvl="0" indent="0" algn="l" defTabSz="914400" rtl="0" eaLnBrk="1" fontAlgn="auto" latinLnBrk="0" hangingPunct="1">
+                        <a:lnSpc>
+                          <a:spcPct val="100000"/>
+                        </a:lnSpc>
+                        <a:spcBef>
+                          <a:spcPts val="0"/>
+                        </a:spcBef>
+                        <a:spcAft>
+                          <a:spcPts val="0"/>
+                        </a:spcAft>
+                        <a:buClr>
+                          <a:srgbClr val="000000"/>
+                        </a:buClr>
+                        <a:buSzTx/>
+                        <a:buFont typeface="Arial"/>
+                        <a:buNone/>
+                        <a:tabLst/>
+                        <a:defRPr/>
+                      </a:pPr>
+                      <a:endParaRPr lang="en-SE" sz="1600" b="0" i="1" dirty="0">
+                        <a:latin typeface="Verdana" panose="020B0604030504040204" pitchFamily="34" charset="0"/>
+                        <a:ea typeface="Verdana" panose="020B0604030504040204" pitchFamily="34" charset="0"/>
+                        <a:cs typeface="Verdana" panose="020B0604030504040204" pitchFamily="34" charset="0"/>
+                      </a:endParaRPr>
+                    </a:p>
+                  </a:txBody>
+                  <a:tcPr>
+                    <a:lnL w="12700" cap="flat" cmpd="sng" algn="ctr">
+                      <a:solidFill>
+                        <a:schemeClr val="tx1"/>
+                      </a:solidFill>
+                      <a:prstDash val="solid"/>
+                      <a:round/>
+                      <a:headEnd type="none" w="med" len="med"/>
+                      <a:tailEnd type="none" w="med" len="med"/>
+                    </a:lnL>
+                    <a:lnR w="12700" cap="flat" cmpd="sng" algn="ctr">
+                      <a:noFill/>
+                      <a:prstDash val="solid"/>
+                      <a:round/>
+                      <a:headEnd type="none" w="med" len="med"/>
+                      <a:tailEnd type="none" w="med" len="med"/>
+                    </a:lnR>
+                    <a:lnT w="12700" cap="flat" cmpd="sng" algn="ctr">
+                      <a:solidFill>
+                        <a:schemeClr val="tx1"/>
+                      </a:solidFill>
+                      <a:prstDash val="solid"/>
+                      <a:round/>
+                      <a:headEnd type="none" w="med" len="med"/>
+                      <a:tailEnd type="none" w="med" len="med"/>
+                    </a:lnT>
+                    <a:lnB w="12700" cap="flat" cmpd="sng" algn="ctr">
+                      <a:solidFill>
+                        <a:schemeClr val="tx1"/>
+                      </a:solidFill>
+                      <a:prstDash val="solid"/>
+                      <a:round/>
+                      <a:headEnd type="none" w="med" len="med"/>
+                      <a:tailEnd type="none" w="med" len="med"/>
+                    </a:lnB>
+                    <a:lnTlToBr w="12700" cmpd="sng">
+                      <a:noFill/>
+                      <a:prstDash val="solid"/>
+                    </a:lnTlToBr>
+                    <a:lnBlToTr w="12700" cmpd="sng">
+                      <a:noFill/>
+                      <a:prstDash val="solid"/>
+                    </a:lnBlToTr>
+                  </a:tcPr>
+                </a:tc>
+                <a:tc>
+                  <a:txBody>
+                    <a:bodyPr/>
+                    <a:lstStyle/>
+                    <a:p>
+                      <a:pPr marL="0" marR="0" lvl="0" indent="0" algn="l" defTabSz="914400" rtl="0" eaLnBrk="1" fontAlgn="auto" latinLnBrk="0" hangingPunct="1">
+                        <a:lnSpc>
+                          <a:spcPct val="100000"/>
+                        </a:lnSpc>
+                        <a:spcBef>
+                          <a:spcPts val="0"/>
+                        </a:spcBef>
+                        <a:spcAft>
+                          <a:spcPts val="0"/>
+                        </a:spcAft>
+                        <a:buClr>
+                          <a:srgbClr val="000000"/>
+                        </a:buClr>
+                        <a:buSzTx/>
+                        <a:buFont typeface="Arial"/>
+                        <a:buNone/>
+                        <a:tabLst/>
+                        <a:defRPr/>
+                      </a:pPr>
+                      <a:r>
+                        <a:rPr lang="en-GB" sz="1600" b="0" i="1" dirty="0" err="1">
+                          <a:latin typeface="Verdana" panose="020B0604030504040204" pitchFamily="34" charset="0"/>
+                          <a:ea typeface="Verdana" panose="020B0604030504040204" pitchFamily="34" charset="0"/>
+                          <a:cs typeface="Verdana" panose="020B0604030504040204" pitchFamily="34" charset="0"/>
+                        </a:rPr>
+                        <a:t>example.nox</a:t>
+                      </a:r>
+                      <a:endParaRPr lang="en-SE" sz="1600" b="0" i="1" dirty="0">
+                        <a:latin typeface="Verdana" panose="020B0604030504040204" pitchFamily="34" charset="0"/>
+                        <a:ea typeface="Verdana" panose="020B0604030504040204" pitchFamily="34" charset="0"/>
+                        <a:cs typeface="Verdana" panose="020B0604030504040204" pitchFamily="34" charset="0"/>
+                      </a:endParaRPr>
+                    </a:p>
+                  </a:txBody>
+                  <a:tcPr>
+                    <a:lnL w="12700" cap="flat" cmpd="sng" algn="ctr">
+                      <a:noFill/>
+                      <a:prstDash val="solid"/>
+                      <a:round/>
+                      <a:headEnd type="none" w="med" len="med"/>
+                      <a:tailEnd type="none" w="med" len="med"/>
+                    </a:lnL>
+                    <a:lnR w="12700" cap="flat" cmpd="sng" algn="ctr">
+                      <a:solidFill>
+                        <a:schemeClr val="tx1"/>
+                      </a:solidFill>
+                      <a:prstDash val="solid"/>
+                      <a:round/>
+                      <a:headEnd type="none" w="med" len="med"/>
+                      <a:tailEnd type="none" w="med" len="med"/>
+                    </a:lnR>
+                    <a:lnT w="12700" cap="flat" cmpd="sng" algn="ctr">
+                      <a:solidFill>
+                        <a:schemeClr val="tx1"/>
+                      </a:solidFill>
+                      <a:prstDash val="solid"/>
+                      <a:round/>
+                      <a:headEnd type="none" w="med" len="med"/>
+                      <a:tailEnd type="none" w="med" len="med"/>
+                    </a:lnT>
+                    <a:lnB w="12700" cap="flat" cmpd="sng" algn="ctr">
+                      <a:solidFill>
+                        <a:schemeClr val="tx1"/>
+                      </a:solidFill>
+                      <a:prstDash val="solid"/>
+                      <a:round/>
+                      <a:headEnd type="none" w="med" len="med"/>
+                      <a:tailEnd type="none" w="med" len="med"/>
+                    </a:lnB>
+                    <a:lnTlToBr w="12700" cmpd="sng">
+                      <a:noFill/>
+                      <a:prstDash val="solid"/>
+                    </a:lnTlToBr>
+                    <a:lnBlToTr w="12700" cmpd="sng">
+                      <a:noFill/>
+                      <a:prstDash val="solid"/>
+                    </a:lnBlToTr>
+                  </a:tcPr>
+                </a:tc>
+                <a:extLst>
+                  <a:ext uri="{0D108BD9-81ED-4DB2-BD59-A6C34878D82A}">
+                    <a16:rowId xmlns:a16="http://schemas.microsoft.com/office/drawing/2014/main" val="2080353602"/>
+                  </a:ext>
+                </a:extLst>
+              </a:tr>
+              <a:tr h="370840">
+                <a:tc>
+                  <a:txBody>
+                    <a:bodyPr/>
+                    <a:lstStyle/>
+                    <a:p>
+                      <a:pPr algn="r"/>
+                      <a:r>
+                        <a:rPr lang="en-SE" sz="1600" b="0" i="0" dirty="0">
+                          <a:latin typeface="Verdana" panose="020B0604030504040204" pitchFamily="34" charset="0"/>
+                          <a:ea typeface="Verdana" panose="020B0604030504040204" pitchFamily="34" charset="0"/>
+                          <a:cs typeface="Verdana" panose="020B0604030504040204" pitchFamily="34" charset="0"/>
+                        </a:rPr>
+                        <a:t>1</a:t>
+                      </a:r>
+                    </a:p>
+                  </a:txBody>
+                  <a:tcPr>
+                    <a:lnL w="12700" cap="flat" cmpd="sng" algn="ctr">
+                      <a:solidFill>
+                        <a:schemeClr val="tx1"/>
+                      </a:solidFill>
+                      <a:prstDash val="solid"/>
+                      <a:round/>
+                      <a:headEnd type="none" w="med" len="med"/>
+                      <a:tailEnd type="none" w="med" len="med"/>
+                    </a:lnL>
+                    <a:lnR w="12700" cap="flat" cmpd="sng" algn="ctr">
+                      <a:solidFill>
+                        <a:schemeClr val="tx1"/>
+                      </a:solidFill>
+                      <a:prstDash val="solid"/>
+                      <a:round/>
+                      <a:headEnd type="none" w="med" len="med"/>
+                      <a:tailEnd type="none" w="med" len="med"/>
+                    </a:lnR>
+                    <a:lnT w="12700" cap="flat" cmpd="sng" algn="ctr">
+                      <a:solidFill>
+                        <a:schemeClr val="tx1"/>
+                      </a:solidFill>
+                      <a:prstDash val="solid"/>
+                      <a:round/>
+                      <a:headEnd type="none" w="med" len="med"/>
+                      <a:tailEnd type="none" w="med" len="med"/>
+                    </a:lnT>
+                    <a:lnB w="12700" cap="flat" cmpd="sng" algn="ctr">
+                      <a:solidFill>
+                        <a:schemeClr val="tx1"/>
+                      </a:solidFill>
+                      <a:prstDash val="solid"/>
+                      <a:round/>
+                      <a:headEnd type="none" w="med" len="med"/>
+                      <a:tailEnd type="none" w="med" len="med"/>
+                    </a:lnB>
+                    <a:lnTlToBr w="12700" cmpd="sng">
+                      <a:noFill/>
+                      <a:prstDash val="solid"/>
+                    </a:lnTlToBr>
+                    <a:lnBlToTr w="12700" cmpd="sng">
+                      <a:noFill/>
+                      <a:prstDash val="solid"/>
+                    </a:lnBlToTr>
+                  </a:tcPr>
+                </a:tc>
+                <a:tc>
+                  <a:txBody>
+                    <a:bodyPr/>
+                    <a:lstStyle/>
+                    <a:p>
+                      <a:r>
+                        <a:rPr lang="en-SE" sz="1600" b="0" i="0" dirty="0">
+                          <a:solidFill>
+                            <a:srgbClr val="00B0F0"/>
+                          </a:solidFill>
+                          <a:latin typeface="Andale Mono" panose="020B0509000000000004" pitchFamily="49" charset="0"/>
+                          <a:ea typeface="Verdana" panose="020B0604030504040204" pitchFamily="34" charset="0"/>
+                          <a:cs typeface="Verdana" panose="020B0604030504040204" pitchFamily="34" charset="0"/>
+                        </a:rPr>
+                        <a:t>123</a:t>
+                      </a:r>
+                    </a:p>
+                  </a:txBody>
+                  <a:tcPr>
+                    <a:lnL w="12700" cap="flat" cmpd="sng" algn="ctr">
+                      <a:solidFill>
+                        <a:schemeClr val="tx1"/>
+                      </a:solidFill>
+                      <a:prstDash val="solid"/>
+                      <a:round/>
+                      <a:headEnd type="none" w="med" len="med"/>
+                      <a:tailEnd type="none" w="med" len="med"/>
+                    </a:lnL>
+                    <a:lnR w="12700" cap="flat" cmpd="sng" algn="ctr">
+                      <a:solidFill>
+                        <a:schemeClr val="tx1"/>
+                      </a:solidFill>
+                      <a:prstDash val="solid"/>
+                      <a:round/>
+                      <a:headEnd type="none" w="med" len="med"/>
+                      <a:tailEnd type="none" w="med" len="med"/>
+                    </a:lnR>
+                    <a:lnT w="12700" cap="flat" cmpd="sng" algn="ctr">
+                      <a:solidFill>
+                        <a:schemeClr val="tx1"/>
+                      </a:solidFill>
+                      <a:prstDash val="solid"/>
+                      <a:round/>
+                      <a:headEnd type="none" w="med" len="med"/>
+                      <a:tailEnd type="none" w="med" len="med"/>
+                    </a:lnT>
+                    <a:lnB w="12700" cap="flat" cmpd="sng" algn="ctr">
+                      <a:solidFill>
+                        <a:schemeClr val="tx1"/>
+                      </a:solidFill>
+                      <a:prstDash val="solid"/>
+                      <a:round/>
+                      <a:headEnd type="none" w="med" len="med"/>
+                      <a:tailEnd type="none" w="med" len="med"/>
+                    </a:lnB>
+                    <a:lnTlToBr w="12700" cmpd="sng">
+                      <a:noFill/>
+                      <a:prstDash val="solid"/>
+                    </a:lnTlToBr>
+                    <a:lnBlToTr w="12700" cmpd="sng">
+                      <a:noFill/>
+                      <a:prstDash val="solid"/>
+                    </a:lnBlToTr>
+                  </a:tcPr>
+                </a:tc>
+                <a:extLst>
+                  <a:ext uri="{0D108BD9-81ED-4DB2-BD59-A6C34878D82A}">
+                    <a16:rowId xmlns:a16="http://schemas.microsoft.com/office/drawing/2014/main" val="3374414353"/>
+                  </a:ext>
+                </a:extLst>
+              </a:tr>
+            </a:tbl>
+          </a:graphicData>
+        </a:graphic>
+      </p:graphicFrame>
+      <p:sp>
+        <p:nvSpPr>
+          <p:cNvPr id="20" name="Title 46">
+            <a:extLst>
+              <a:ext uri="{FF2B5EF4-FFF2-40B4-BE49-F238E27FC236}">
+                <a16:creationId xmlns:a16="http://schemas.microsoft.com/office/drawing/2014/main" id="{AA1608CB-CA24-40D1-63B9-2EAE19583A68}"/>
+              </a:ext>
+            </a:extLst>
+          </p:cNvPr>
+          <p:cNvSpPr txBox="1">
+            <a:spLocks/>
+          </p:cNvSpPr>
+          <p:nvPr/>
+        </p:nvSpPr>
+        <p:spPr>
+          <a:xfrm>
+            <a:off x="643468" y="3429000"/>
+            <a:ext cx="11159067" cy="1343734"/>
+          </a:xfrm>
+          <a:prstGeom prst="rect">
+            <a:avLst/>
+          </a:prstGeom>
+          <a:noFill/>
+          <a:ln>
+            <a:noFill/>
+          </a:ln>
+        </p:spPr>
+        <p:txBody>
+          <a:bodyPr spcFirstLastPara="1" wrap="square" lIns="91425" tIns="91425" rIns="91425" bIns="91425" anchor="ctr" anchorCtr="0">
+            <a:noAutofit/>
+          </a:bodyPr>
+          <a:lstStyle>
+            <a:defPPr marR="0" lvl="0" algn="l" rtl="0">
+              <a:lnSpc>
+                <a:spcPct val="100000"/>
+              </a:lnSpc>
+              <a:spcBef>
+                <a:spcPts val="0"/>
+              </a:spcBef>
+              <a:spcAft>
+                <a:spcPts val="0"/>
+              </a:spcAft>
+            </a:defPPr>
+            <a:lvl1pPr marR="0" lvl="0" algn="l" rtl="0" eaLnBrk="1" hangingPunct="1">
+              <a:lnSpc>
+                <a:spcPct val="100000"/>
+              </a:lnSpc>
+              <a:spcBef>
+                <a:spcPts val="0"/>
+              </a:spcBef>
+              <a:spcAft>
+                <a:spcPts val="0"/>
+              </a:spcAft>
+              <a:buClr>
+                <a:schemeClr val="dk1"/>
+              </a:buClr>
+              <a:buSzPts val="3300"/>
+              <a:buFont typeface="Quantico"/>
+              <a:buNone/>
+              <a:defRPr sz="3300" b="0" i="0" u="none" strike="noStrike" cap="none">
+                <a:solidFill>
+                  <a:schemeClr val="dk1"/>
+                </a:solidFill>
+                <a:latin typeface="Quantico"/>
+                <a:ea typeface="Quantico"/>
+                <a:cs typeface="Quantico"/>
+                <a:sym typeface="Quantico"/>
+              </a:defRPr>
+            </a:lvl1pPr>
+            <a:lvl2pPr marR="0" lvl="1" algn="l" rtl="0" eaLnBrk="1" hangingPunct="1">
+              <a:lnSpc>
+                <a:spcPct val="100000"/>
+              </a:lnSpc>
+              <a:spcBef>
+                <a:spcPts val="0"/>
+              </a:spcBef>
+              <a:spcAft>
+                <a:spcPts val="0"/>
+              </a:spcAft>
+              <a:buClr>
+                <a:schemeClr val="dk1"/>
+              </a:buClr>
+              <a:buSzPts val="3300"/>
+              <a:buFont typeface="Quantico"/>
+              <a:buNone/>
+              <a:defRPr sz="3300" b="1" i="0" u="none" strike="noStrike" cap="none">
+                <a:solidFill>
+                  <a:schemeClr val="dk1"/>
+                </a:solidFill>
+                <a:latin typeface="Quantico"/>
+                <a:ea typeface="Quantico"/>
+                <a:cs typeface="Quantico"/>
+                <a:sym typeface="Quantico"/>
+              </a:defRPr>
+            </a:lvl2pPr>
+            <a:lvl3pPr marR="0" lvl="2" algn="l" rtl="0" eaLnBrk="1" hangingPunct="1">
+              <a:lnSpc>
+                <a:spcPct val="100000"/>
+              </a:lnSpc>
+              <a:spcBef>
+                <a:spcPts val="0"/>
+              </a:spcBef>
+              <a:spcAft>
+                <a:spcPts val="0"/>
+              </a:spcAft>
+              <a:buClr>
+                <a:schemeClr val="dk1"/>
+              </a:buClr>
+              <a:buSzPts val="3300"/>
+              <a:buFont typeface="Quantico"/>
+              <a:buNone/>
+              <a:defRPr sz="3300" b="1" i="0" u="none" strike="noStrike" cap="none">
+                <a:solidFill>
+                  <a:schemeClr val="dk1"/>
+                </a:solidFill>
+                <a:latin typeface="Quantico"/>
+                <a:ea typeface="Quantico"/>
+                <a:cs typeface="Quantico"/>
+                <a:sym typeface="Quantico"/>
+              </a:defRPr>
+            </a:lvl3pPr>
+            <a:lvl4pPr marR="0" lvl="3" algn="l" rtl="0" eaLnBrk="1" hangingPunct="1">
+              <a:lnSpc>
+                <a:spcPct val="100000"/>
+              </a:lnSpc>
+              <a:spcBef>
+                <a:spcPts val="0"/>
+              </a:spcBef>
+              <a:spcAft>
+                <a:spcPts val="0"/>
+              </a:spcAft>
+              <a:buClr>
+                <a:schemeClr val="dk1"/>
+              </a:buClr>
+              <a:buSzPts val="3300"/>
+              <a:buFont typeface="Quantico"/>
+              <a:buNone/>
+              <a:defRPr sz="3300" b="1" i="0" u="none" strike="noStrike" cap="none">
+                <a:solidFill>
+                  <a:schemeClr val="dk1"/>
+                </a:solidFill>
+                <a:latin typeface="Quantico"/>
+                <a:ea typeface="Quantico"/>
+                <a:cs typeface="Quantico"/>
+                <a:sym typeface="Quantico"/>
+              </a:defRPr>
+            </a:lvl4pPr>
+            <a:lvl5pPr marR="0" lvl="4" algn="l" rtl="0" eaLnBrk="1" hangingPunct="1">
+              <a:lnSpc>
+                <a:spcPct val="100000"/>
+              </a:lnSpc>
+              <a:spcBef>
+                <a:spcPts val="0"/>
+              </a:spcBef>
+              <a:spcAft>
+                <a:spcPts val="0"/>
+              </a:spcAft>
+              <a:buClr>
+                <a:schemeClr val="dk1"/>
+              </a:buClr>
+              <a:buSzPts val="3300"/>
+              <a:buFont typeface="Quantico"/>
+              <a:buNone/>
+              <a:defRPr sz="3300" b="1" i="0" u="none" strike="noStrike" cap="none">
+                <a:solidFill>
+                  <a:schemeClr val="dk1"/>
+                </a:solidFill>
+                <a:latin typeface="Quantico"/>
+                <a:ea typeface="Quantico"/>
+                <a:cs typeface="Quantico"/>
+                <a:sym typeface="Quantico"/>
+              </a:defRPr>
+            </a:lvl5pPr>
+            <a:lvl6pPr marR="0" lvl="5" algn="l" rtl="0" eaLnBrk="1" hangingPunct="1">
+              <a:lnSpc>
+                <a:spcPct val="100000"/>
+              </a:lnSpc>
+              <a:spcBef>
+                <a:spcPts val="0"/>
+              </a:spcBef>
+              <a:spcAft>
+                <a:spcPts val="0"/>
+              </a:spcAft>
+              <a:buClr>
+                <a:schemeClr val="dk1"/>
+              </a:buClr>
+              <a:buSzPts val="3300"/>
+              <a:buFont typeface="Quantico"/>
+              <a:buNone/>
+              <a:defRPr sz="3300" b="1" i="0" u="none" strike="noStrike" cap="none">
+                <a:solidFill>
+                  <a:schemeClr val="dk1"/>
+                </a:solidFill>
+                <a:latin typeface="Quantico"/>
+                <a:ea typeface="Quantico"/>
+                <a:cs typeface="Quantico"/>
+                <a:sym typeface="Quantico"/>
+              </a:defRPr>
+            </a:lvl6pPr>
+            <a:lvl7pPr marR="0" lvl="6" algn="l" rtl="0" eaLnBrk="1" hangingPunct="1">
+              <a:lnSpc>
+                <a:spcPct val="100000"/>
+              </a:lnSpc>
+              <a:spcBef>
+                <a:spcPts val="0"/>
+              </a:spcBef>
+              <a:spcAft>
+                <a:spcPts val="0"/>
+              </a:spcAft>
+              <a:buClr>
+                <a:schemeClr val="dk1"/>
+              </a:buClr>
+              <a:buSzPts val="3300"/>
+              <a:buFont typeface="Quantico"/>
+              <a:buNone/>
+              <a:defRPr sz="3300" b="1" i="0" u="none" strike="noStrike" cap="none">
+                <a:solidFill>
+                  <a:schemeClr val="dk1"/>
+                </a:solidFill>
+                <a:latin typeface="Quantico"/>
+                <a:ea typeface="Quantico"/>
+                <a:cs typeface="Quantico"/>
+                <a:sym typeface="Quantico"/>
+              </a:defRPr>
+            </a:lvl7pPr>
+            <a:lvl8pPr marR="0" lvl="7" algn="l" rtl="0" eaLnBrk="1" hangingPunct="1">
+              <a:lnSpc>
+                <a:spcPct val="100000"/>
+              </a:lnSpc>
+              <a:spcBef>
+                <a:spcPts val="0"/>
+              </a:spcBef>
+              <a:spcAft>
+                <a:spcPts val="0"/>
+              </a:spcAft>
+              <a:buClr>
+                <a:schemeClr val="dk1"/>
+              </a:buClr>
+              <a:buSzPts val="3300"/>
+              <a:buFont typeface="Quantico"/>
+              <a:buNone/>
+              <a:defRPr sz="3300" b="1" i="0" u="none" strike="noStrike" cap="none">
+                <a:solidFill>
+                  <a:schemeClr val="dk1"/>
+                </a:solidFill>
+                <a:latin typeface="Quantico"/>
+                <a:ea typeface="Quantico"/>
+                <a:cs typeface="Quantico"/>
+                <a:sym typeface="Quantico"/>
+              </a:defRPr>
+            </a:lvl8pPr>
+            <a:lvl9pPr marR="0" lvl="8" algn="l" rtl="0" eaLnBrk="1" hangingPunct="1">
+              <a:lnSpc>
+                <a:spcPct val="100000"/>
+              </a:lnSpc>
+              <a:spcBef>
+                <a:spcPts val="0"/>
+              </a:spcBef>
+              <a:spcAft>
+                <a:spcPts val="0"/>
+              </a:spcAft>
+              <a:buClr>
+                <a:schemeClr val="dk1"/>
+              </a:buClr>
+              <a:buSzPts val="3300"/>
+              <a:buFont typeface="Quantico"/>
+              <a:buNone/>
+              <a:defRPr sz="3300" b="1" i="0" u="none" strike="noStrike" cap="none">
+                <a:solidFill>
+                  <a:schemeClr val="dk1"/>
+                </a:solidFill>
+                <a:latin typeface="Quantico"/>
+                <a:ea typeface="Quantico"/>
+                <a:cs typeface="Quantico"/>
+                <a:sym typeface="Quantico"/>
+              </a:defRPr>
+            </a:lvl9pPr>
+          </a:lstStyle>
+          <a:p>
+            <a:r>
+              <a:rPr lang="en-SE" dirty="0"/>
+              <a:t>A program with just a number literal.</a:t>
+            </a:r>
+          </a:p>
+        </p:txBody>
+      </p:sp>
+      <p:sp>
+        <p:nvSpPr>
+          <p:cNvPr id="21" name="Title 46">
+            <a:extLst>
+              <a:ext uri="{FF2B5EF4-FFF2-40B4-BE49-F238E27FC236}">
+                <a16:creationId xmlns:a16="http://schemas.microsoft.com/office/drawing/2014/main" id="{097F2442-B2FD-3F8E-4775-6C9D047B05CE}"/>
+              </a:ext>
+            </a:extLst>
+          </p:cNvPr>
+          <p:cNvSpPr txBox="1">
+            <a:spLocks/>
+          </p:cNvSpPr>
+          <p:nvPr/>
+        </p:nvSpPr>
+        <p:spPr>
+          <a:xfrm>
+            <a:off x="516465" y="4772734"/>
+            <a:ext cx="11159067" cy="1343734"/>
+          </a:xfrm>
+          <a:prstGeom prst="rect">
+            <a:avLst/>
+          </a:prstGeom>
+          <a:noFill/>
+          <a:ln>
+            <a:noFill/>
+          </a:ln>
+        </p:spPr>
+        <p:txBody>
+          <a:bodyPr spcFirstLastPara="1" wrap="square" lIns="91425" tIns="91425" rIns="91425" bIns="91425" anchor="ctr" anchorCtr="0">
+            <a:noAutofit/>
+          </a:bodyPr>
+          <a:lstStyle>
+            <a:defPPr marR="0" lvl="0" algn="l" rtl="0">
+              <a:lnSpc>
+                <a:spcPct val="100000"/>
+              </a:lnSpc>
+              <a:spcBef>
+                <a:spcPts val="0"/>
+              </a:spcBef>
+              <a:spcAft>
+                <a:spcPts val="0"/>
+              </a:spcAft>
+            </a:defPPr>
+            <a:lvl1pPr marR="0" lvl="0" algn="l" rtl="0" eaLnBrk="1" hangingPunct="1">
+              <a:lnSpc>
+                <a:spcPct val="100000"/>
+              </a:lnSpc>
+              <a:spcBef>
+                <a:spcPts val="0"/>
+              </a:spcBef>
+              <a:spcAft>
+                <a:spcPts val="0"/>
+              </a:spcAft>
+              <a:buClr>
+                <a:schemeClr val="dk1"/>
+              </a:buClr>
+              <a:buSzPts val="3300"/>
+              <a:buFont typeface="Quantico"/>
+              <a:buNone/>
+              <a:defRPr sz="3300" b="0" i="0" u="none" strike="noStrike" cap="none">
+                <a:solidFill>
+                  <a:schemeClr val="dk1"/>
+                </a:solidFill>
+                <a:latin typeface="Quantico"/>
+                <a:ea typeface="Quantico"/>
+                <a:cs typeface="Quantico"/>
+                <a:sym typeface="Quantico"/>
+              </a:defRPr>
+            </a:lvl1pPr>
+            <a:lvl2pPr marR="0" lvl="1" algn="l" rtl="0" eaLnBrk="1" hangingPunct="1">
+              <a:lnSpc>
+                <a:spcPct val="100000"/>
+              </a:lnSpc>
+              <a:spcBef>
+                <a:spcPts val="0"/>
+              </a:spcBef>
+              <a:spcAft>
+                <a:spcPts val="0"/>
+              </a:spcAft>
+              <a:buClr>
+                <a:schemeClr val="dk1"/>
+              </a:buClr>
+              <a:buSzPts val="3300"/>
+              <a:buFont typeface="Quantico"/>
+              <a:buNone/>
+              <a:defRPr sz="3300" b="1" i="0" u="none" strike="noStrike" cap="none">
+                <a:solidFill>
+                  <a:schemeClr val="dk1"/>
+                </a:solidFill>
+                <a:latin typeface="Quantico"/>
+                <a:ea typeface="Quantico"/>
+                <a:cs typeface="Quantico"/>
+                <a:sym typeface="Quantico"/>
+              </a:defRPr>
+            </a:lvl2pPr>
+            <a:lvl3pPr marR="0" lvl="2" algn="l" rtl="0" eaLnBrk="1" hangingPunct="1">
+              <a:lnSpc>
+                <a:spcPct val="100000"/>
+              </a:lnSpc>
+              <a:spcBef>
+                <a:spcPts val="0"/>
+              </a:spcBef>
+              <a:spcAft>
+                <a:spcPts val="0"/>
+              </a:spcAft>
+              <a:buClr>
+                <a:schemeClr val="dk1"/>
+              </a:buClr>
+              <a:buSzPts val="3300"/>
+              <a:buFont typeface="Quantico"/>
+              <a:buNone/>
+              <a:defRPr sz="3300" b="1" i="0" u="none" strike="noStrike" cap="none">
+                <a:solidFill>
+                  <a:schemeClr val="dk1"/>
+                </a:solidFill>
+                <a:latin typeface="Quantico"/>
+                <a:ea typeface="Quantico"/>
+                <a:cs typeface="Quantico"/>
+                <a:sym typeface="Quantico"/>
+              </a:defRPr>
+            </a:lvl3pPr>
+            <a:lvl4pPr marR="0" lvl="3" algn="l" rtl="0" eaLnBrk="1" hangingPunct="1">
+              <a:lnSpc>
+                <a:spcPct val="100000"/>
+              </a:lnSpc>
+              <a:spcBef>
+                <a:spcPts val="0"/>
+              </a:spcBef>
+              <a:spcAft>
+                <a:spcPts val="0"/>
+              </a:spcAft>
+              <a:buClr>
+                <a:schemeClr val="dk1"/>
+              </a:buClr>
+              <a:buSzPts val="3300"/>
+              <a:buFont typeface="Quantico"/>
+              <a:buNone/>
+              <a:defRPr sz="3300" b="1" i="0" u="none" strike="noStrike" cap="none">
+                <a:solidFill>
+                  <a:schemeClr val="dk1"/>
+                </a:solidFill>
+                <a:latin typeface="Quantico"/>
+                <a:ea typeface="Quantico"/>
+                <a:cs typeface="Quantico"/>
+                <a:sym typeface="Quantico"/>
+              </a:defRPr>
+            </a:lvl4pPr>
+            <a:lvl5pPr marR="0" lvl="4" algn="l" rtl="0" eaLnBrk="1" hangingPunct="1">
+              <a:lnSpc>
+                <a:spcPct val="100000"/>
+              </a:lnSpc>
+              <a:spcBef>
+                <a:spcPts val="0"/>
+              </a:spcBef>
+              <a:spcAft>
+                <a:spcPts val="0"/>
+              </a:spcAft>
+              <a:buClr>
+                <a:schemeClr val="dk1"/>
+              </a:buClr>
+              <a:buSzPts val="3300"/>
+              <a:buFont typeface="Quantico"/>
+              <a:buNone/>
+              <a:defRPr sz="3300" b="1" i="0" u="none" strike="noStrike" cap="none">
+                <a:solidFill>
+                  <a:schemeClr val="dk1"/>
+                </a:solidFill>
+                <a:latin typeface="Quantico"/>
+                <a:ea typeface="Quantico"/>
+                <a:cs typeface="Quantico"/>
+                <a:sym typeface="Quantico"/>
+              </a:defRPr>
+            </a:lvl5pPr>
+            <a:lvl6pPr marR="0" lvl="5" algn="l" rtl="0" eaLnBrk="1" hangingPunct="1">
+              <a:lnSpc>
+                <a:spcPct val="100000"/>
+              </a:lnSpc>
+              <a:spcBef>
+                <a:spcPts val="0"/>
+              </a:spcBef>
+              <a:spcAft>
+                <a:spcPts val="0"/>
+              </a:spcAft>
+              <a:buClr>
+                <a:schemeClr val="dk1"/>
+              </a:buClr>
+              <a:buSzPts val="3300"/>
+              <a:buFont typeface="Quantico"/>
+              <a:buNone/>
+              <a:defRPr sz="3300" b="1" i="0" u="none" strike="noStrike" cap="none">
+                <a:solidFill>
+                  <a:schemeClr val="dk1"/>
+                </a:solidFill>
+                <a:latin typeface="Quantico"/>
+                <a:ea typeface="Quantico"/>
+                <a:cs typeface="Quantico"/>
+                <a:sym typeface="Quantico"/>
+              </a:defRPr>
+            </a:lvl6pPr>
+            <a:lvl7pPr marR="0" lvl="6" algn="l" rtl="0" eaLnBrk="1" hangingPunct="1">
+              <a:lnSpc>
+                <a:spcPct val="100000"/>
+              </a:lnSpc>
+              <a:spcBef>
+                <a:spcPts val="0"/>
+              </a:spcBef>
+              <a:spcAft>
+                <a:spcPts val="0"/>
+              </a:spcAft>
+              <a:buClr>
+                <a:schemeClr val="dk1"/>
+              </a:buClr>
+              <a:buSzPts val="3300"/>
+              <a:buFont typeface="Quantico"/>
+              <a:buNone/>
+              <a:defRPr sz="3300" b="1" i="0" u="none" strike="noStrike" cap="none">
+                <a:solidFill>
+                  <a:schemeClr val="dk1"/>
+                </a:solidFill>
+                <a:latin typeface="Quantico"/>
+                <a:ea typeface="Quantico"/>
+                <a:cs typeface="Quantico"/>
+                <a:sym typeface="Quantico"/>
+              </a:defRPr>
+            </a:lvl7pPr>
+            <a:lvl8pPr marR="0" lvl="7" algn="l" rtl="0" eaLnBrk="1" hangingPunct="1">
+              <a:lnSpc>
+                <a:spcPct val="100000"/>
+              </a:lnSpc>
+              <a:spcBef>
+                <a:spcPts val="0"/>
+              </a:spcBef>
+              <a:spcAft>
+                <a:spcPts val="0"/>
+              </a:spcAft>
+              <a:buClr>
+                <a:schemeClr val="dk1"/>
+              </a:buClr>
+              <a:buSzPts val="3300"/>
+              <a:buFont typeface="Quantico"/>
+              <a:buNone/>
+              <a:defRPr sz="3300" b="1" i="0" u="none" strike="noStrike" cap="none">
+                <a:solidFill>
+                  <a:schemeClr val="dk1"/>
+                </a:solidFill>
+                <a:latin typeface="Quantico"/>
+                <a:ea typeface="Quantico"/>
+                <a:cs typeface="Quantico"/>
+                <a:sym typeface="Quantico"/>
+              </a:defRPr>
+            </a:lvl8pPr>
+            <a:lvl9pPr marR="0" lvl="8" algn="l" rtl="0" eaLnBrk="1" hangingPunct="1">
+              <a:lnSpc>
+                <a:spcPct val="100000"/>
+              </a:lnSpc>
+              <a:spcBef>
+                <a:spcPts val="0"/>
+              </a:spcBef>
+              <a:spcAft>
+                <a:spcPts val="0"/>
+              </a:spcAft>
+              <a:buClr>
+                <a:schemeClr val="dk1"/>
+              </a:buClr>
+              <a:buSzPts val="3300"/>
+              <a:buFont typeface="Quantico"/>
+              <a:buNone/>
+              <a:defRPr sz="3300" b="1" i="0" u="none" strike="noStrike" cap="none">
+                <a:solidFill>
+                  <a:schemeClr val="dk1"/>
+                </a:solidFill>
+                <a:latin typeface="Quantico"/>
+                <a:ea typeface="Quantico"/>
+                <a:cs typeface="Quantico"/>
+                <a:sym typeface="Quantico"/>
+              </a:defRPr>
+            </a:lvl9pPr>
+          </a:lstStyle>
+          <a:p>
+            <a:r>
+              <a:rPr lang="en-SE" dirty="0"/>
+              <a:t>Let us build a full interpreted and JIT-compiled programming language that evaluates this program!</a:t>
+            </a:r>
+          </a:p>
+        </p:txBody>
+      </p:sp>
+    </p:spTree>
+    <p:extLst>
+      <p:ext uri="{BB962C8B-B14F-4D97-AF65-F5344CB8AC3E}">
+        <p14:creationId xmlns:p14="http://schemas.microsoft.com/office/powerpoint/2010/main" val="21685783"/>
+      </p:ext>
+    </p:extLst>
+  </p:cSld>
+  <p:clrMapOvr>
+    <a:masterClrMapping/>
+  </p:clrMapOvr>
+  <mc:AlternateContent xmlns:mc="http://schemas.openxmlformats.org/markup-compatibility/2006" xmlns:p159="http://schemas.microsoft.com/office/powerpoint/2015/09/main">
+    <mc:Choice Requires="p159">
+      <p:transition xmlns:p14="http://schemas.microsoft.com/office/powerpoint/2010/main" spd="slow" p14:dur="2000">
+        <p159:morph option="byObject"/>
+      </p:transition>
+    </mc:Choice>
+    <mc:Fallback xmlns="">
       <p:transition spd="slow">
         <p:fade/>
       </p:transition>
@@ -14087,13 +15461,13 @@
   <p:clrMapOvr>
     <a:masterClrMapping/>
   </p:clrMapOvr>
-  <mc:AlternateContent xmlns:mc="http://schemas.openxmlformats.org/markup-compatibility/2006">
-    <mc:Choice xmlns:p159="http://schemas.microsoft.com/office/powerpoint/2015/09/main" Requires="p159">
+  <mc:AlternateContent xmlns:mc="http://schemas.openxmlformats.org/markup-compatibility/2006" xmlns:p159="http://schemas.microsoft.com/office/powerpoint/2015/09/main">
+    <mc:Choice Requires="p159">
       <p:transition xmlns:p14="http://schemas.microsoft.com/office/powerpoint/2010/main" spd="slow" p14:dur="2000">
         <p159:morph option="byObject"/>
       </p:transition>
     </mc:Choice>
-    <mc:Fallback>
+    <mc:Fallback xmlns="">
       <p:transition spd="slow">
         <p:fade/>
       </p:transition>
@@ -18023,13 +19397,13 @@
   <p:clrMapOvr>
     <a:masterClrMapping/>
   </p:clrMapOvr>
-  <mc:AlternateContent xmlns:mc="http://schemas.openxmlformats.org/markup-compatibility/2006">
-    <mc:Choice xmlns:p159="http://schemas.microsoft.com/office/powerpoint/2015/09/main" Requires="p159">
+  <mc:AlternateContent xmlns:mc="http://schemas.openxmlformats.org/markup-compatibility/2006" xmlns:p159="http://schemas.microsoft.com/office/powerpoint/2015/09/main">
+    <mc:Choice Requires="p159">
       <p:transition xmlns:p14="http://schemas.microsoft.com/office/powerpoint/2010/main" spd="slow" p14:dur="2000">
         <p159:morph option="byObject"/>
       </p:transition>
     </mc:Choice>
-    <mc:Fallback>
+    <mc:Fallback xmlns="">
       <p:transition spd="slow">
         <p:fade/>
       </p:transition>
@@ -19198,51 +20572,7 @@
         </p:nvSpPr>
         <p:spPr>
           <a:xfrm>
-            <a:off x="4317433" y="2225116"/>
-            <a:ext cx="3557133" cy="3539067"/>
-          </a:xfrm>
-          <a:prstGeom prst="roundRect">
-            <a:avLst/>
-          </a:prstGeom>
-        </p:spPr>
-        <p:style>
-          <a:lnRef idx="2">
-            <a:schemeClr val="accent6"/>
-          </a:lnRef>
-          <a:fillRef idx="1">
-            <a:schemeClr val="lt1"/>
-          </a:fillRef>
-          <a:effectRef idx="0">
-            <a:schemeClr val="accent6"/>
-          </a:effectRef>
-          <a:fontRef idx="minor">
-            <a:schemeClr val="dk1"/>
-          </a:fontRef>
-        </p:style>
-        <p:txBody>
-          <a:bodyPr rtlCol="0" anchor="ctr"/>
-          <a:lstStyle/>
-          <a:p>
-            <a:pPr algn="ctr"/>
-            <a:endParaRPr lang="en-SE"/>
-          </a:p>
-        </p:txBody>
-      </p:sp>
-      <p:sp>
-        <p:nvSpPr>
-          <p:cNvPr id="26" name="Rounded Rectangle 25">
-            <a:extLst>
-              <a:ext uri="{FF2B5EF4-FFF2-40B4-BE49-F238E27FC236}">
-                <a16:creationId xmlns:a16="http://schemas.microsoft.com/office/drawing/2014/main" id="{47D8B5E8-18D7-41A0-A629-07B03F504974}"/>
-              </a:ext>
-            </a:extLst>
-          </p:cNvPr>
-          <p:cNvSpPr/>
-          <p:nvPr/>
-        </p:nvSpPr>
-        <p:spPr>
-          <a:xfrm>
-            <a:off x="8292964" y="2225116"/>
+            <a:off x="8322268" y="2225116"/>
             <a:ext cx="3557133" cy="3539067"/>
           </a:xfrm>
           <a:prstGeom prst="roundRect">
@@ -19312,7 +20642,7 @@
           <a:lstStyle/>
           <a:p>
             <a:pPr algn="ctr"/>
-            <a:endParaRPr lang="en-SE"/>
+            <a:endParaRPr lang="en-SE" dirty="0"/>
           </a:p>
         </p:txBody>
       </p:sp>
@@ -19940,7 +21270,7 @@
         </p:nvSpPr>
         <p:spPr>
           <a:xfrm>
-            <a:off x="4380800" y="2496722"/>
+            <a:off x="8385635" y="2496722"/>
             <a:ext cx="3430400" cy="768000"/>
           </a:xfrm>
           <a:prstGeom prst="rect">
@@ -20207,293 +21537,6 @@
             <a:r>
               <a:rPr lang="en-SE" dirty="0"/>
               <a:t>Machine code</a:t>
-            </a:r>
-          </a:p>
-        </p:txBody>
-      </p:sp>
-      <p:sp>
-        <p:nvSpPr>
-          <p:cNvPr id="4" name="Title 46">
-            <a:extLst>
-              <a:ext uri="{FF2B5EF4-FFF2-40B4-BE49-F238E27FC236}">
-                <a16:creationId xmlns:a16="http://schemas.microsoft.com/office/drawing/2014/main" id="{0A1369A8-7826-9D96-609C-E0544F9695EB}"/>
-              </a:ext>
-            </a:extLst>
-          </p:cNvPr>
-          <p:cNvSpPr txBox="1">
-            <a:spLocks/>
-          </p:cNvSpPr>
-          <p:nvPr/>
-        </p:nvSpPr>
-        <p:spPr>
-          <a:xfrm>
-            <a:off x="8292964" y="2490495"/>
-            <a:ext cx="3430400" cy="768000"/>
-          </a:xfrm>
-          <a:prstGeom prst="rect">
-            <a:avLst/>
-          </a:prstGeom>
-          <a:noFill/>
-          <a:ln>
-            <a:noFill/>
-          </a:ln>
-        </p:spPr>
-        <p:txBody>
-          <a:bodyPr spcFirstLastPara="1" wrap="square" lIns="91425" tIns="91425" rIns="91425" bIns="91425" anchor="ctr" anchorCtr="0">
-            <a:noAutofit/>
-          </a:bodyPr>
-          <a:lstStyle>
-            <a:defPPr marR="0" lvl="0" algn="l" rtl="0">
-              <a:lnSpc>
-                <a:spcPct val="100000"/>
-              </a:lnSpc>
-              <a:spcBef>
-                <a:spcPts val="0"/>
-              </a:spcBef>
-              <a:spcAft>
-                <a:spcPts val="0"/>
-              </a:spcAft>
-            </a:defPPr>
-            <a:lvl1pPr marR="0" lvl="0" algn="l" rtl="0" eaLnBrk="1" hangingPunct="1">
-              <a:lnSpc>
-                <a:spcPct val="100000"/>
-              </a:lnSpc>
-              <a:spcBef>
-                <a:spcPts val="0"/>
-              </a:spcBef>
-              <a:spcAft>
-                <a:spcPts val="0"/>
-              </a:spcAft>
-              <a:buClr>
-                <a:schemeClr val="dk1"/>
-              </a:buClr>
-              <a:buSzPts val="3300"/>
-              <a:buFont typeface="Quantico"/>
-              <a:buNone/>
-              <a:defRPr sz="3300" b="0" i="0" u="none" strike="noStrike" cap="none">
-                <a:solidFill>
-                  <a:schemeClr val="dk1"/>
-                </a:solidFill>
-                <a:latin typeface="Quantico"/>
-                <a:ea typeface="Quantico"/>
-                <a:cs typeface="Quantico"/>
-                <a:sym typeface="Quantico"/>
-              </a:defRPr>
-            </a:lvl1pPr>
-            <a:lvl2pPr marR="0" lvl="1" algn="l" rtl="0" eaLnBrk="1" hangingPunct="1">
-              <a:lnSpc>
-                <a:spcPct val="100000"/>
-              </a:lnSpc>
-              <a:spcBef>
-                <a:spcPts val="0"/>
-              </a:spcBef>
-              <a:spcAft>
-                <a:spcPts val="0"/>
-              </a:spcAft>
-              <a:buClr>
-                <a:schemeClr val="dk1"/>
-              </a:buClr>
-              <a:buSzPts val="3300"/>
-              <a:buFont typeface="Quantico"/>
-              <a:buNone/>
-              <a:defRPr sz="3300" b="1" i="0" u="none" strike="noStrike" cap="none">
-                <a:solidFill>
-                  <a:schemeClr val="dk1"/>
-                </a:solidFill>
-                <a:latin typeface="Quantico"/>
-                <a:ea typeface="Quantico"/>
-                <a:cs typeface="Quantico"/>
-                <a:sym typeface="Quantico"/>
-              </a:defRPr>
-            </a:lvl2pPr>
-            <a:lvl3pPr marR="0" lvl="2" algn="l" rtl="0" eaLnBrk="1" hangingPunct="1">
-              <a:lnSpc>
-                <a:spcPct val="100000"/>
-              </a:lnSpc>
-              <a:spcBef>
-                <a:spcPts val="0"/>
-              </a:spcBef>
-              <a:spcAft>
-                <a:spcPts val="0"/>
-              </a:spcAft>
-              <a:buClr>
-                <a:schemeClr val="dk1"/>
-              </a:buClr>
-              <a:buSzPts val="3300"/>
-              <a:buFont typeface="Quantico"/>
-              <a:buNone/>
-              <a:defRPr sz="3300" b="1" i="0" u="none" strike="noStrike" cap="none">
-                <a:solidFill>
-                  <a:schemeClr val="dk1"/>
-                </a:solidFill>
-                <a:latin typeface="Quantico"/>
-                <a:ea typeface="Quantico"/>
-                <a:cs typeface="Quantico"/>
-                <a:sym typeface="Quantico"/>
-              </a:defRPr>
-            </a:lvl3pPr>
-            <a:lvl4pPr marR="0" lvl="3" algn="l" rtl="0" eaLnBrk="1" hangingPunct="1">
-              <a:lnSpc>
-                <a:spcPct val="100000"/>
-              </a:lnSpc>
-              <a:spcBef>
-                <a:spcPts val="0"/>
-              </a:spcBef>
-              <a:spcAft>
-                <a:spcPts val="0"/>
-              </a:spcAft>
-              <a:buClr>
-                <a:schemeClr val="dk1"/>
-              </a:buClr>
-              <a:buSzPts val="3300"/>
-              <a:buFont typeface="Quantico"/>
-              <a:buNone/>
-              <a:defRPr sz="3300" b="1" i="0" u="none" strike="noStrike" cap="none">
-                <a:solidFill>
-                  <a:schemeClr val="dk1"/>
-                </a:solidFill>
-                <a:latin typeface="Quantico"/>
-                <a:ea typeface="Quantico"/>
-                <a:cs typeface="Quantico"/>
-                <a:sym typeface="Quantico"/>
-              </a:defRPr>
-            </a:lvl4pPr>
-            <a:lvl5pPr marR="0" lvl="4" algn="l" rtl="0" eaLnBrk="1" hangingPunct="1">
-              <a:lnSpc>
-                <a:spcPct val="100000"/>
-              </a:lnSpc>
-              <a:spcBef>
-                <a:spcPts val="0"/>
-              </a:spcBef>
-              <a:spcAft>
-                <a:spcPts val="0"/>
-              </a:spcAft>
-              <a:buClr>
-                <a:schemeClr val="dk1"/>
-              </a:buClr>
-              <a:buSzPts val="3300"/>
-              <a:buFont typeface="Quantico"/>
-              <a:buNone/>
-              <a:defRPr sz="3300" b="1" i="0" u="none" strike="noStrike" cap="none">
-                <a:solidFill>
-                  <a:schemeClr val="dk1"/>
-                </a:solidFill>
-                <a:latin typeface="Quantico"/>
-                <a:ea typeface="Quantico"/>
-                <a:cs typeface="Quantico"/>
-                <a:sym typeface="Quantico"/>
-              </a:defRPr>
-            </a:lvl5pPr>
-            <a:lvl6pPr marR="0" lvl="5" algn="l" rtl="0" eaLnBrk="1" hangingPunct="1">
-              <a:lnSpc>
-                <a:spcPct val="100000"/>
-              </a:lnSpc>
-              <a:spcBef>
-                <a:spcPts val="0"/>
-              </a:spcBef>
-              <a:spcAft>
-                <a:spcPts val="0"/>
-              </a:spcAft>
-              <a:buClr>
-                <a:schemeClr val="dk1"/>
-              </a:buClr>
-              <a:buSzPts val="3300"/>
-              <a:buFont typeface="Quantico"/>
-              <a:buNone/>
-              <a:defRPr sz="3300" b="1" i="0" u="none" strike="noStrike" cap="none">
-                <a:solidFill>
-                  <a:schemeClr val="dk1"/>
-                </a:solidFill>
-                <a:latin typeface="Quantico"/>
-                <a:ea typeface="Quantico"/>
-                <a:cs typeface="Quantico"/>
-                <a:sym typeface="Quantico"/>
-              </a:defRPr>
-            </a:lvl6pPr>
-            <a:lvl7pPr marR="0" lvl="6" algn="l" rtl="0" eaLnBrk="1" hangingPunct="1">
-              <a:lnSpc>
-                <a:spcPct val="100000"/>
-              </a:lnSpc>
-              <a:spcBef>
-                <a:spcPts val="0"/>
-              </a:spcBef>
-              <a:spcAft>
-                <a:spcPts val="0"/>
-              </a:spcAft>
-              <a:buClr>
-                <a:schemeClr val="dk1"/>
-              </a:buClr>
-              <a:buSzPts val="3300"/>
-              <a:buFont typeface="Quantico"/>
-              <a:buNone/>
-              <a:defRPr sz="3300" b="1" i="0" u="none" strike="noStrike" cap="none">
-                <a:solidFill>
-                  <a:schemeClr val="dk1"/>
-                </a:solidFill>
-                <a:latin typeface="Quantico"/>
-                <a:ea typeface="Quantico"/>
-                <a:cs typeface="Quantico"/>
-                <a:sym typeface="Quantico"/>
-              </a:defRPr>
-            </a:lvl7pPr>
-            <a:lvl8pPr marR="0" lvl="7" algn="l" rtl="0" eaLnBrk="1" hangingPunct="1">
-              <a:lnSpc>
-                <a:spcPct val="100000"/>
-              </a:lnSpc>
-              <a:spcBef>
-                <a:spcPts val="0"/>
-              </a:spcBef>
-              <a:spcAft>
-                <a:spcPts val="0"/>
-              </a:spcAft>
-              <a:buClr>
-                <a:schemeClr val="dk1"/>
-              </a:buClr>
-              <a:buSzPts val="3300"/>
-              <a:buFont typeface="Quantico"/>
-              <a:buNone/>
-              <a:defRPr sz="3300" b="1" i="0" u="none" strike="noStrike" cap="none">
-                <a:solidFill>
-                  <a:schemeClr val="dk1"/>
-                </a:solidFill>
-                <a:latin typeface="Quantico"/>
-                <a:ea typeface="Quantico"/>
-                <a:cs typeface="Quantico"/>
-                <a:sym typeface="Quantico"/>
-              </a:defRPr>
-            </a:lvl8pPr>
-            <a:lvl9pPr marR="0" lvl="8" algn="l" rtl="0" eaLnBrk="1" hangingPunct="1">
-              <a:lnSpc>
-                <a:spcPct val="100000"/>
-              </a:lnSpc>
-              <a:spcBef>
-                <a:spcPts val="0"/>
-              </a:spcBef>
-              <a:spcAft>
-                <a:spcPts val="0"/>
-              </a:spcAft>
-              <a:buClr>
-                <a:schemeClr val="dk1"/>
-              </a:buClr>
-              <a:buSzPts val="3300"/>
-              <a:buFont typeface="Quantico"/>
-              <a:buNone/>
-              <a:defRPr sz="3300" b="1" i="0" u="none" strike="noStrike" cap="none">
-                <a:solidFill>
-                  <a:schemeClr val="dk1"/>
-                </a:solidFill>
-                <a:latin typeface="Quantico"/>
-                <a:ea typeface="Quantico"/>
-                <a:cs typeface="Quantico"/>
-                <a:sym typeface="Quantico"/>
-              </a:defRPr>
-            </a:lvl9pPr>
-          </a:lstStyle>
-          <a:p>
-            <a:pPr algn="ctr"/>
-            <a:r>
-              <a:rPr lang="en-SE" dirty="0"/>
-              <a:t>IR code</a:t>
             </a:r>
           </a:p>
         </p:txBody>
@@ -20801,7 +21844,7 @@
         </p:nvSpPr>
         <p:spPr>
           <a:xfrm>
-            <a:off x="4380800" y="3547233"/>
+            <a:off x="8385635" y="3547233"/>
             <a:ext cx="3430400" cy="768000"/>
           </a:xfrm>
           <a:prstGeom prst="rect">
@@ -21068,293 +22111,6 @@
             <a:r>
               <a:rPr lang="en-SE" dirty="0"/>
               <a:t>Linker</a:t>
-            </a:r>
-          </a:p>
-        </p:txBody>
-      </p:sp>
-      <p:sp>
-        <p:nvSpPr>
-          <p:cNvPr id="7" name="Title 46">
-            <a:extLst>
-              <a:ext uri="{FF2B5EF4-FFF2-40B4-BE49-F238E27FC236}">
-                <a16:creationId xmlns:a16="http://schemas.microsoft.com/office/drawing/2014/main" id="{31E06244-3AFC-3EEF-C180-933BD09D330F}"/>
-              </a:ext>
-            </a:extLst>
-          </p:cNvPr>
-          <p:cNvSpPr txBox="1">
-            <a:spLocks/>
-          </p:cNvSpPr>
-          <p:nvPr/>
-        </p:nvSpPr>
-        <p:spPr>
-          <a:xfrm>
-            <a:off x="8292964" y="3541006"/>
-            <a:ext cx="3430400" cy="768000"/>
-          </a:xfrm>
-          <a:prstGeom prst="rect">
-            <a:avLst/>
-          </a:prstGeom>
-          <a:noFill/>
-          <a:ln>
-            <a:noFill/>
-          </a:ln>
-        </p:spPr>
-        <p:txBody>
-          <a:bodyPr spcFirstLastPara="1" wrap="square" lIns="91425" tIns="91425" rIns="91425" bIns="91425" anchor="ctr" anchorCtr="0">
-            <a:noAutofit/>
-          </a:bodyPr>
-          <a:lstStyle>
-            <a:defPPr marR="0" lvl="0" algn="l" rtl="0">
-              <a:lnSpc>
-                <a:spcPct val="100000"/>
-              </a:lnSpc>
-              <a:spcBef>
-                <a:spcPts val="0"/>
-              </a:spcBef>
-              <a:spcAft>
-                <a:spcPts val="0"/>
-              </a:spcAft>
-            </a:defPPr>
-            <a:lvl1pPr marR="0" lvl="0" algn="l" rtl="0" eaLnBrk="1" hangingPunct="1">
-              <a:lnSpc>
-                <a:spcPct val="100000"/>
-              </a:lnSpc>
-              <a:spcBef>
-                <a:spcPts val="0"/>
-              </a:spcBef>
-              <a:spcAft>
-                <a:spcPts val="0"/>
-              </a:spcAft>
-              <a:buClr>
-                <a:schemeClr val="dk1"/>
-              </a:buClr>
-              <a:buSzPts val="3300"/>
-              <a:buFont typeface="Quantico"/>
-              <a:buNone/>
-              <a:defRPr sz="3300" b="0" i="0" u="none" strike="noStrike" cap="none">
-                <a:solidFill>
-                  <a:schemeClr val="dk1"/>
-                </a:solidFill>
-                <a:latin typeface="Quantico"/>
-                <a:ea typeface="Quantico"/>
-                <a:cs typeface="Quantico"/>
-                <a:sym typeface="Quantico"/>
-              </a:defRPr>
-            </a:lvl1pPr>
-            <a:lvl2pPr marR="0" lvl="1" algn="l" rtl="0" eaLnBrk="1" hangingPunct="1">
-              <a:lnSpc>
-                <a:spcPct val="100000"/>
-              </a:lnSpc>
-              <a:spcBef>
-                <a:spcPts val="0"/>
-              </a:spcBef>
-              <a:spcAft>
-                <a:spcPts val="0"/>
-              </a:spcAft>
-              <a:buClr>
-                <a:schemeClr val="dk1"/>
-              </a:buClr>
-              <a:buSzPts val="3300"/>
-              <a:buFont typeface="Quantico"/>
-              <a:buNone/>
-              <a:defRPr sz="3300" b="1" i="0" u="none" strike="noStrike" cap="none">
-                <a:solidFill>
-                  <a:schemeClr val="dk1"/>
-                </a:solidFill>
-                <a:latin typeface="Quantico"/>
-                <a:ea typeface="Quantico"/>
-                <a:cs typeface="Quantico"/>
-                <a:sym typeface="Quantico"/>
-              </a:defRPr>
-            </a:lvl2pPr>
-            <a:lvl3pPr marR="0" lvl="2" algn="l" rtl="0" eaLnBrk="1" hangingPunct="1">
-              <a:lnSpc>
-                <a:spcPct val="100000"/>
-              </a:lnSpc>
-              <a:spcBef>
-                <a:spcPts val="0"/>
-              </a:spcBef>
-              <a:spcAft>
-                <a:spcPts val="0"/>
-              </a:spcAft>
-              <a:buClr>
-                <a:schemeClr val="dk1"/>
-              </a:buClr>
-              <a:buSzPts val="3300"/>
-              <a:buFont typeface="Quantico"/>
-              <a:buNone/>
-              <a:defRPr sz="3300" b="1" i="0" u="none" strike="noStrike" cap="none">
-                <a:solidFill>
-                  <a:schemeClr val="dk1"/>
-                </a:solidFill>
-                <a:latin typeface="Quantico"/>
-                <a:ea typeface="Quantico"/>
-                <a:cs typeface="Quantico"/>
-                <a:sym typeface="Quantico"/>
-              </a:defRPr>
-            </a:lvl3pPr>
-            <a:lvl4pPr marR="0" lvl="3" algn="l" rtl="0" eaLnBrk="1" hangingPunct="1">
-              <a:lnSpc>
-                <a:spcPct val="100000"/>
-              </a:lnSpc>
-              <a:spcBef>
-                <a:spcPts val="0"/>
-              </a:spcBef>
-              <a:spcAft>
-                <a:spcPts val="0"/>
-              </a:spcAft>
-              <a:buClr>
-                <a:schemeClr val="dk1"/>
-              </a:buClr>
-              <a:buSzPts val="3300"/>
-              <a:buFont typeface="Quantico"/>
-              <a:buNone/>
-              <a:defRPr sz="3300" b="1" i="0" u="none" strike="noStrike" cap="none">
-                <a:solidFill>
-                  <a:schemeClr val="dk1"/>
-                </a:solidFill>
-                <a:latin typeface="Quantico"/>
-                <a:ea typeface="Quantico"/>
-                <a:cs typeface="Quantico"/>
-                <a:sym typeface="Quantico"/>
-              </a:defRPr>
-            </a:lvl4pPr>
-            <a:lvl5pPr marR="0" lvl="4" algn="l" rtl="0" eaLnBrk="1" hangingPunct="1">
-              <a:lnSpc>
-                <a:spcPct val="100000"/>
-              </a:lnSpc>
-              <a:spcBef>
-                <a:spcPts val="0"/>
-              </a:spcBef>
-              <a:spcAft>
-                <a:spcPts val="0"/>
-              </a:spcAft>
-              <a:buClr>
-                <a:schemeClr val="dk1"/>
-              </a:buClr>
-              <a:buSzPts val="3300"/>
-              <a:buFont typeface="Quantico"/>
-              <a:buNone/>
-              <a:defRPr sz="3300" b="1" i="0" u="none" strike="noStrike" cap="none">
-                <a:solidFill>
-                  <a:schemeClr val="dk1"/>
-                </a:solidFill>
-                <a:latin typeface="Quantico"/>
-                <a:ea typeface="Quantico"/>
-                <a:cs typeface="Quantico"/>
-                <a:sym typeface="Quantico"/>
-              </a:defRPr>
-            </a:lvl5pPr>
-            <a:lvl6pPr marR="0" lvl="5" algn="l" rtl="0" eaLnBrk="1" hangingPunct="1">
-              <a:lnSpc>
-                <a:spcPct val="100000"/>
-              </a:lnSpc>
-              <a:spcBef>
-                <a:spcPts val="0"/>
-              </a:spcBef>
-              <a:spcAft>
-                <a:spcPts val="0"/>
-              </a:spcAft>
-              <a:buClr>
-                <a:schemeClr val="dk1"/>
-              </a:buClr>
-              <a:buSzPts val="3300"/>
-              <a:buFont typeface="Quantico"/>
-              <a:buNone/>
-              <a:defRPr sz="3300" b="1" i="0" u="none" strike="noStrike" cap="none">
-                <a:solidFill>
-                  <a:schemeClr val="dk1"/>
-                </a:solidFill>
-                <a:latin typeface="Quantico"/>
-                <a:ea typeface="Quantico"/>
-                <a:cs typeface="Quantico"/>
-                <a:sym typeface="Quantico"/>
-              </a:defRPr>
-            </a:lvl6pPr>
-            <a:lvl7pPr marR="0" lvl="6" algn="l" rtl="0" eaLnBrk="1" hangingPunct="1">
-              <a:lnSpc>
-                <a:spcPct val="100000"/>
-              </a:lnSpc>
-              <a:spcBef>
-                <a:spcPts val="0"/>
-              </a:spcBef>
-              <a:spcAft>
-                <a:spcPts val="0"/>
-              </a:spcAft>
-              <a:buClr>
-                <a:schemeClr val="dk1"/>
-              </a:buClr>
-              <a:buSzPts val="3300"/>
-              <a:buFont typeface="Quantico"/>
-              <a:buNone/>
-              <a:defRPr sz="3300" b="1" i="0" u="none" strike="noStrike" cap="none">
-                <a:solidFill>
-                  <a:schemeClr val="dk1"/>
-                </a:solidFill>
-                <a:latin typeface="Quantico"/>
-                <a:ea typeface="Quantico"/>
-                <a:cs typeface="Quantico"/>
-                <a:sym typeface="Quantico"/>
-              </a:defRPr>
-            </a:lvl7pPr>
-            <a:lvl8pPr marR="0" lvl="7" algn="l" rtl="0" eaLnBrk="1" hangingPunct="1">
-              <a:lnSpc>
-                <a:spcPct val="100000"/>
-              </a:lnSpc>
-              <a:spcBef>
-                <a:spcPts val="0"/>
-              </a:spcBef>
-              <a:spcAft>
-                <a:spcPts val="0"/>
-              </a:spcAft>
-              <a:buClr>
-                <a:schemeClr val="dk1"/>
-              </a:buClr>
-              <a:buSzPts val="3300"/>
-              <a:buFont typeface="Quantico"/>
-              <a:buNone/>
-              <a:defRPr sz="3300" b="1" i="0" u="none" strike="noStrike" cap="none">
-                <a:solidFill>
-                  <a:schemeClr val="dk1"/>
-                </a:solidFill>
-                <a:latin typeface="Quantico"/>
-                <a:ea typeface="Quantico"/>
-                <a:cs typeface="Quantico"/>
-                <a:sym typeface="Quantico"/>
-              </a:defRPr>
-            </a:lvl8pPr>
-            <a:lvl9pPr marR="0" lvl="8" algn="l" rtl="0" eaLnBrk="1" hangingPunct="1">
-              <a:lnSpc>
-                <a:spcPct val="100000"/>
-              </a:lnSpc>
-              <a:spcBef>
-                <a:spcPts val="0"/>
-              </a:spcBef>
-              <a:spcAft>
-                <a:spcPts val="0"/>
-              </a:spcAft>
-              <a:buClr>
-                <a:schemeClr val="dk1"/>
-              </a:buClr>
-              <a:buSzPts val="3300"/>
-              <a:buFont typeface="Quantico"/>
-              <a:buNone/>
-              <a:defRPr sz="3300" b="1" i="0" u="none" strike="noStrike" cap="none">
-                <a:solidFill>
-                  <a:schemeClr val="dk1"/>
-                </a:solidFill>
-                <a:latin typeface="Quantico"/>
-                <a:ea typeface="Quantico"/>
-                <a:cs typeface="Quantico"/>
-                <a:sym typeface="Quantico"/>
-              </a:defRPr>
-            </a:lvl9pPr>
-          </a:lstStyle>
-          <a:p>
-            <a:pPr algn="ctr"/>
-            <a:r>
-              <a:rPr lang="en-SE" dirty="0"/>
-              <a:t>Other phases</a:t>
             </a:r>
           </a:p>
         </p:txBody>
@@ -21662,7 +22418,7 @@
         </p:nvSpPr>
         <p:spPr>
           <a:xfrm>
-            <a:off x="4380800" y="4603971"/>
+            <a:off x="8385635" y="4603971"/>
             <a:ext cx="3430400" cy="768000"/>
           </a:xfrm>
           <a:prstGeom prst="rect">
@@ -21929,293 +22685,6 @@
             <a:r>
               <a:rPr lang="en-SE" dirty="0"/>
               <a:t>Executable</a:t>
-            </a:r>
-          </a:p>
-        </p:txBody>
-      </p:sp>
-      <p:sp>
-        <p:nvSpPr>
-          <p:cNvPr id="10" name="Title 46">
-            <a:extLst>
-              <a:ext uri="{FF2B5EF4-FFF2-40B4-BE49-F238E27FC236}">
-                <a16:creationId xmlns:a16="http://schemas.microsoft.com/office/drawing/2014/main" id="{70FA2ED8-D67C-2F3B-4EE8-183787BBFBD0}"/>
-              </a:ext>
-            </a:extLst>
-          </p:cNvPr>
-          <p:cNvSpPr txBox="1">
-            <a:spLocks/>
-          </p:cNvSpPr>
-          <p:nvPr/>
-        </p:nvSpPr>
-        <p:spPr>
-          <a:xfrm>
-            <a:off x="8292964" y="4597744"/>
-            <a:ext cx="3430400" cy="768000"/>
-          </a:xfrm>
-          <a:prstGeom prst="rect">
-            <a:avLst/>
-          </a:prstGeom>
-          <a:noFill/>
-          <a:ln>
-            <a:noFill/>
-          </a:ln>
-        </p:spPr>
-        <p:txBody>
-          <a:bodyPr spcFirstLastPara="1" wrap="square" lIns="91425" tIns="91425" rIns="91425" bIns="91425" anchor="ctr" anchorCtr="0">
-            <a:noAutofit/>
-          </a:bodyPr>
-          <a:lstStyle>
-            <a:defPPr marR="0" lvl="0" algn="l" rtl="0">
-              <a:lnSpc>
-                <a:spcPct val="100000"/>
-              </a:lnSpc>
-              <a:spcBef>
-                <a:spcPts val="0"/>
-              </a:spcBef>
-              <a:spcAft>
-                <a:spcPts val="0"/>
-              </a:spcAft>
-            </a:defPPr>
-            <a:lvl1pPr marR="0" lvl="0" algn="l" rtl="0" eaLnBrk="1" hangingPunct="1">
-              <a:lnSpc>
-                <a:spcPct val="100000"/>
-              </a:lnSpc>
-              <a:spcBef>
-                <a:spcPts val="0"/>
-              </a:spcBef>
-              <a:spcAft>
-                <a:spcPts val="0"/>
-              </a:spcAft>
-              <a:buClr>
-                <a:schemeClr val="dk1"/>
-              </a:buClr>
-              <a:buSzPts val="3300"/>
-              <a:buFont typeface="Quantico"/>
-              <a:buNone/>
-              <a:defRPr sz="3300" b="0" i="0" u="none" strike="noStrike" cap="none">
-                <a:solidFill>
-                  <a:schemeClr val="dk1"/>
-                </a:solidFill>
-                <a:latin typeface="Quantico"/>
-                <a:ea typeface="Quantico"/>
-                <a:cs typeface="Quantico"/>
-                <a:sym typeface="Quantico"/>
-              </a:defRPr>
-            </a:lvl1pPr>
-            <a:lvl2pPr marR="0" lvl="1" algn="l" rtl="0" eaLnBrk="1" hangingPunct="1">
-              <a:lnSpc>
-                <a:spcPct val="100000"/>
-              </a:lnSpc>
-              <a:spcBef>
-                <a:spcPts val="0"/>
-              </a:spcBef>
-              <a:spcAft>
-                <a:spcPts val="0"/>
-              </a:spcAft>
-              <a:buClr>
-                <a:schemeClr val="dk1"/>
-              </a:buClr>
-              <a:buSzPts val="3300"/>
-              <a:buFont typeface="Quantico"/>
-              <a:buNone/>
-              <a:defRPr sz="3300" b="1" i="0" u="none" strike="noStrike" cap="none">
-                <a:solidFill>
-                  <a:schemeClr val="dk1"/>
-                </a:solidFill>
-                <a:latin typeface="Quantico"/>
-                <a:ea typeface="Quantico"/>
-                <a:cs typeface="Quantico"/>
-                <a:sym typeface="Quantico"/>
-              </a:defRPr>
-            </a:lvl2pPr>
-            <a:lvl3pPr marR="0" lvl="2" algn="l" rtl="0" eaLnBrk="1" hangingPunct="1">
-              <a:lnSpc>
-                <a:spcPct val="100000"/>
-              </a:lnSpc>
-              <a:spcBef>
-                <a:spcPts val="0"/>
-              </a:spcBef>
-              <a:spcAft>
-                <a:spcPts val="0"/>
-              </a:spcAft>
-              <a:buClr>
-                <a:schemeClr val="dk1"/>
-              </a:buClr>
-              <a:buSzPts val="3300"/>
-              <a:buFont typeface="Quantico"/>
-              <a:buNone/>
-              <a:defRPr sz="3300" b="1" i="0" u="none" strike="noStrike" cap="none">
-                <a:solidFill>
-                  <a:schemeClr val="dk1"/>
-                </a:solidFill>
-                <a:latin typeface="Quantico"/>
-                <a:ea typeface="Quantico"/>
-                <a:cs typeface="Quantico"/>
-                <a:sym typeface="Quantico"/>
-              </a:defRPr>
-            </a:lvl3pPr>
-            <a:lvl4pPr marR="0" lvl="3" algn="l" rtl="0" eaLnBrk="1" hangingPunct="1">
-              <a:lnSpc>
-                <a:spcPct val="100000"/>
-              </a:lnSpc>
-              <a:spcBef>
-                <a:spcPts val="0"/>
-              </a:spcBef>
-              <a:spcAft>
-                <a:spcPts val="0"/>
-              </a:spcAft>
-              <a:buClr>
-                <a:schemeClr val="dk1"/>
-              </a:buClr>
-              <a:buSzPts val="3300"/>
-              <a:buFont typeface="Quantico"/>
-              <a:buNone/>
-              <a:defRPr sz="3300" b="1" i="0" u="none" strike="noStrike" cap="none">
-                <a:solidFill>
-                  <a:schemeClr val="dk1"/>
-                </a:solidFill>
-                <a:latin typeface="Quantico"/>
-                <a:ea typeface="Quantico"/>
-                <a:cs typeface="Quantico"/>
-                <a:sym typeface="Quantico"/>
-              </a:defRPr>
-            </a:lvl4pPr>
-            <a:lvl5pPr marR="0" lvl="4" algn="l" rtl="0" eaLnBrk="1" hangingPunct="1">
-              <a:lnSpc>
-                <a:spcPct val="100000"/>
-              </a:lnSpc>
-              <a:spcBef>
-                <a:spcPts val="0"/>
-              </a:spcBef>
-              <a:spcAft>
-                <a:spcPts val="0"/>
-              </a:spcAft>
-              <a:buClr>
-                <a:schemeClr val="dk1"/>
-              </a:buClr>
-              <a:buSzPts val="3300"/>
-              <a:buFont typeface="Quantico"/>
-              <a:buNone/>
-              <a:defRPr sz="3300" b="1" i="0" u="none" strike="noStrike" cap="none">
-                <a:solidFill>
-                  <a:schemeClr val="dk1"/>
-                </a:solidFill>
-                <a:latin typeface="Quantico"/>
-                <a:ea typeface="Quantico"/>
-                <a:cs typeface="Quantico"/>
-                <a:sym typeface="Quantico"/>
-              </a:defRPr>
-            </a:lvl5pPr>
-            <a:lvl6pPr marR="0" lvl="5" algn="l" rtl="0" eaLnBrk="1" hangingPunct="1">
-              <a:lnSpc>
-                <a:spcPct val="100000"/>
-              </a:lnSpc>
-              <a:spcBef>
-                <a:spcPts val="0"/>
-              </a:spcBef>
-              <a:spcAft>
-                <a:spcPts val="0"/>
-              </a:spcAft>
-              <a:buClr>
-                <a:schemeClr val="dk1"/>
-              </a:buClr>
-              <a:buSzPts val="3300"/>
-              <a:buFont typeface="Quantico"/>
-              <a:buNone/>
-              <a:defRPr sz="3300" b="1" i="0" u="none" strike="noStrike" cap="none">
-                <a:solidFill>
-                  <a:schemeClr val="dk1"/>
-                </a:solidFill>
-                <a:latin typeface="Quantico"/>
-                <a:ea typeface="Quantico"/>
-                <a:cs typeface="Quantico"/>
-                <a:sym typeface="Quantico"/>
-              </a:defRPr>
-            </a:lvl6pPr>
-            <a:lvl7pPr marR="0" lvl="6" algn="l" rtl="0" eaLnBrk="1" hangingPunct="1">
-              <a:lnSpc>
-                <a:spcPct val="100000"/>
-              </a:lnSpc>
-              <a:spcBef>
-                <a:spcPts val="0"/>
-              </a:spcBef>
-              <a:spcAft>
-                <a:spcPts val="0"/>
-              </a:spcAft>
-              <a:buClr>
-                <a:schemeClr val="dk1"/>
-              </a:buClr>
-              <a:buSzPts val="3300"/>
-              <a:buFont typeface="Quantico"/>
-              <a:buNone/>
-              <a:defRPr sz="3300" b="1" i="0" u="none" strike="noStrike" cap="none">
-                <a:solidFill>
-                  <a:schemeClr val="dk1"/>
-                </a:solidFill>
-                <a:latin typeface="Quantico"/>
-                <a:ea typeface="Quantico"/>
-                <a:cs typeface="Quantico"/>
-                <a:sym typeface="Quantico"/>
-              </a:defRPr>
-            </a:lvl7pPr>
-            <a:lvl8pPr marR="0" lvl="7" algn="l" rtl="0" eaLnBrk="1" hangingPunct="1">
-              <a:lnSpc>
-                <a:spcPct val="100000"/>
-              </a:lnSpc>
-              <a:spcBef>
-                <a:spcPts val="0"/>
-              </a:spcBef>
-              <a:spcAft>
-                <a:spcPts val="0"/>
-              </a:spcAft>
-              <a:buClr>
-                <a:schemeClr val="dk1"/>
-              </a:buClr>
-              <a:buSzPts val="3300"/>
-              <a:buFont typeface="Quantico"/>
-              <a:buNone/>
-              <a:defRPr sz="3300" b="1" i="0" u="none" strike="noStrike" cap="none">
-                <a:solidFill>
-                  <a:schemeClr val="dk1"/>
-                </a:solidFill>
-                <a:latin typeface="Quantico"/>
-                <a:ea typeface="Quantico"/>
-                <a:cs typeface="Quantico"/>
-                <a:sym typeface="Quantico"/>
-              </a:defRPr>
-            </a:lvl8pPr>
-            <a:lvl9pPr marR="0" lvl="8" algn="l" rtl="0" eaLnBrk="1" hangingPunct="1">
-              <a:lnSpc>
-                <a:spcPct val="100000"/>
-              </a:lnSpc>
-              <a:spcBef>
-                <a:spcPts val="0"/>
-              </a:spcBef>
-              <a:spcAft>
-                <a:spcPts val="0"/>
-              </a:spcAft>
-              <a:buClr>
-                <a:schemeClr val="dk1"/>
-              </a:buClr>
-              <a:buSzPts val="3300"/>
-              <a:buFont typeface="Quantico"/>
-              <a:buNone/>
-              <a:defRPr sz="3300" b="1" i="0" u="none" strike="noStrike" cap="none">
-                <a:solidFill>
-                  <a:schemeClr val="dk1"/>
-                </a:solidFill>
-                <a:latin typeface="Quantico"/>
-                <a:ea typeface="Quantico"/>
-                <a:cs typeface="Quantico"/>
-                <a:sym typeface="Quantico"/>
-              </a:defRPr>
-            </a:lvl9pPr>
-          </a:lstStyle>
-          <a:p>
-            <a:pPr algn="ctr"/>
-            <a:r>
-              <a:rPr lang="en-SE" dirty="0"/>
-              <a:t>Byte code Machine code</a:t>
             </a:r>
           </a:p>
         </p:txBody>
@@ -22275,14 +22744,14 @@
           <p:cNvCxnSpPr>
             <a:cxnSpLocks/>
             <a:stCxn id="125" idx="2"/>
-            <a:endCxn id="25" idx="0"/>
+            <a:endCxn id="11" idx="0"/>
           </p:cNvCxnSpPr>
           <p:nvPr/>
         </p:nvCxnSpPr>
         <p:spPr>
           <a:xfrm>
             <a:off x="6096000" y="1722495"/>
-            <a:ext cx="0" cy="502621"/>
+            <a:ext cx="5098" cy="502620"/>
           </a:xfrm>
           <a:prstGeom prst="straightConnector1">
             <a:avLst/>
@@ -22318,7 +22787,6 @@
           <p:cNvCxnSpPr>
             <a:cxnSpLocks/>
             <a:stCxn id="125" idx="3"/>
-            <a:endCxn id="26" idx="0"/>
           </p:cNvCxnSpPr>
           <p:nvPr/>
         </p:nvCxnSpPr>
@@ -22349,6 +22817,911 @@
           </a:fontRef>
         </p:style>
       </p:cxnSp>
+      <p:sp>
+        <p:nvSpPr>
+          <p:cNvPr id="11" name="Rounded Rectangle 10">
+            <a:extLst>
+              <a:ext uri="{FF2B5EF4-FFF2-40B4-BE49-F238E27FC236}">
+                <a16:creationId xmlns:a16="http://schemas.microsoft.com/office/drawing/2014/main" id="{5CCF08BD-E573-638E-CC44-C14773583A9A}"/>
+              </a:ext>
+            </a:extLst>
+          </p:cNvPr>
+          <p:cNvSpPr/>
+          <p:nvPr/>
+        </p:nvSpPr>
+        <p:spPr>
+          <a:xfrm>
+            <a:off x="4322531" y="2225115"/>
+            <a:ext cx="3557133" cy="3539067"/>
+          </a:xfrm>
+          <a:prstGeom prst="roundRect">
+            <a:avLst/>
+          </a:prstGeom>
+        </p:spPr>
+        <p:style>
+          <a:lnRef idx="2">
+            <a:schemeClr val="accent6"/>
+          </a:lnRef>
+          <a:fillRef idx="1">
+            <a:schemeClr val="lt1"/>
+          </a:fillRef>
+          <a:effectRef idx="0">
+            <a:schemeClr val="accent6"/>
+          </a:effectRef>
+          <a:fontRef idx="minor">
+            <a:schemeClr val="dk1"/>
+          </a:fontRef>
+        </p:style>
+        <p:txBody>
+          <a:bodyPr rtlCol="0" anchor="ctr"/>
+          <a:lstStyle/>
+          <a:p>
+            <a:pPr algn="ctr"/>
+            <a:endParaRPr lang="en-SE"/>
+          </a:p>
+        </p:txBody>
+      </p:sp>
+      <p:sp>
+        <p:nvSpPr>
+          <p:cNvPr id="13" name="Title 46">
+            <a:extLst>
+              <a:ext uri="{FF2B5EF4-FFF2-40B4-BE49-F238E27FC236}">
+                <a16:creationId xmlns:a16="http://schemas.microsoft.com/office/drawing/2014/main" id="{43243E11-D8AA-F039-45B9-4F7250C0FEC5}"/>
+              </a:ext>
+            </a:extLst>
+          </p:cNvPr>
+          <p:cNvSpPr txBox="1">
+            <a:spLocks/>
+          </p:cNvSpPr>
+          <p:nvPr/>
+        </p:nvSpPr>
+        <p:spPr>
+          <a:xfrm>
+            <a:off x="4322531" y="2490494"/>
+            <a:ext cx="3430400" cy="768000"/>
+          </a:xfrm>
+          <a:prstGeom prst="rect">
+            <a:avLst/>
+          </a:prstGeom>
+          <a:noFill/>
+          <a:ln>
+            <a:noFill/>
+          </a:ln>
+        </p:spPr>
+        <p:txBody>
+          <a:bodyPr spcFirstLastPara="1" wrap="square" lIns="91425" tIns="91425" rIns="91425" bIns="91425" anchor="ctr" anchorCtr="0">
+            <a:noAutofit/>
+          </a:bodyPr>
+          <a:lstStyle>
+            <a:defPPr marR="0" lvl="0" algn="l" rtl="0">
+              <a:lnSpc>
+                <a:spcPct val="100000"/>
+              </a:lnSpc>
+              <a:spcBef>
+                <a:spcPts val="0"/>
+              </a:spcBef>
+              <a:spcAft>
+                <a:spcPts val="0"/>
+              </a:spcAft>
+            </a:defPPr>
+            <a:lvl1pPr marR="0" lvl="0" algn="l" rtl="0" eaLnBrk="1" hangingPunct="1">
+              <a:lnSpc>
+                <a:spcPct val="100000"/>
+              </a:lnSpc>
+              <a:spcBef>
+                <a:spcPts val="0"/>
+              </a:spcBef>
+              <a:spcAft>
+                <a:spcPts val="0"/>
+              </a:spcAft>
+              <a:buClr>
+                <a:schemeClr val="dk1"/>
+              </a:buClr>
+              <a:buSzPts val="3300"/>
+              <a:buFont typeface="Quantico"/>
+              <a:buNone/>
+              <a:defRPr sz="3300" b="0" i="0" u="none" strike="noStrike" cap="none">
+                <a:solidFill>
+                  <a:schemeClr val="dk1"/>
+                </a:solidFill>
+                <a:latin typeface="Quantico"/>
+                <a:ea typeface="Quantico"/>
+                <a:cs typeface="Quantico"/>
+                <a:sym typeface="Quantico"/>
+              </a:defRPr>
+            </a:lvl1pPr>
+            <a:lvl2pPr marR="0" lvl="1" algn="l" rtl="0" eaLnBrk="1" hangingPunct="1">
+              <a:lnSpc>
+                <a:spcPct val="100000"/>
+              </a:lnSpc>
+              <a:spcBef>
+                <a:spcPts val="0"/>
+              </a:spcBef>
+              <a:spcAft>
+                <a:spcPts val="0"/>
+              </a:spcAft>
+              <a:buClr>
+                <a:schemeClr val="dk1"/>
+              </a:buClr>
+              <a:buSzPts val="3300"/>
+              <a:buFont typeface="Quantico"/>
+              <a:buNone/>
+              <a:defRPr sz="3300" b="1" i="0" u="none" strike="noStrike" cap="none">
+                <a:solidFill>
+                  <a:schemeClr val="dk1"/>
+                </a:solidFill>
+                <a:latin typeface="Quantico"/>
+                <a:ea typeface="Quantico"/>
+                <a:cs typeface="Quantico"/>
+                <a:sym typeface="Quantico"/>
+              </a:defRPr>
+            </a:lvl2pPr>
+            <a:lvl3pPr marR="0" lvl="2" algn="l" rtl="0" eaLnBrk="1" hangingPunct="1">
+              <a:lnSpc>
+                <a:spcPct val="100000"/>
+              </a:lnSpc>
+              <a:spcBef>
+                <a:spcPts val="0"/>
+              </a:spcBef>
+              <a:spcAft>
+                <a:spcPts val="0"/>
+              </a:spcAft>
+              <a:buClr>
+                <a:schemeClr val="dk1"/>
+              </a:buClr>
+              <a:buSzPts val="3300"/>
+              <a:buFont typeface="Quantico"/>
+              <a:buNone/>
+              <a:defRPr sz="3300" b="1" i="0" u="none" strike="noStrike" cap="none">
+                <a:solidFill>
+                  <a:schemeClr val="dk1"/>
+                </a:solidFill>
+                <a:latin typeface="Quantico"/>
+                <a:ea typeface="Quantico"/>
+                <a:cs typeface="Quantico"/>
+                <a:sym typeface="Quantico"/>
+              </a:defRPr>
+            </a:lvl3pPr>
+            <a:lvl4pPr marR="0" lvl="3" algn="l" rtl="0" eaLnBrk="1" hangingPunct="1">
+              <a:lnSpc>
+                <a:spcPct val="100000"/>
+              </a:lnSpc>
+              <a:spcBef>
+                <a:spcPts val="0"/>
+              </a:spcBef>
+              <a:spcAft>
+                <a:spcPts val="0"/>
+              </a:spcAft>
+              <a:buClr>
+                <a:schemeClr val="dk1"/>
+              </a:buClr>
+              <a:buSzPts val="3300"/>
+              <a:buFont typeface="Quantico"/>
+              <a:buNone/>
+              <a:defRPr sz="3300" b="1" i="0" u="none" strike="noStrike" cap="none">
+                <a:solidFill>
+                  <a:schemeClr val="dk1"/>
+                </a:solidFill>
+                <a:latin typeface="Quantico"/>
+                <a:ea typeface="Quantico"/>
+                <a:cs typeface="Quantico"/>
+                <a:sym typeface="Quantico"/>
+              </a:defRPr>
+            </a:lvl4pPr>
+            <a:lvl5pPr marR="0" lvl="4" algn="l" rtl="0" eaLnBrk="1" hangingPunct="1">
+              <a:lnSpc>
+                <a:spcPct val="100000"/>
+              </a:lnSpc>
+              <a:spcBef>
+                <a:spcPts val="0"/>
+              </a:spcBef>
+              <a:spcAft>
+                <a:spcPts val="0"/>
+              </a:spcAft>
+              <a:buClr>
+                <a:schemeClr val="dk1"/>
+              </a:buClr>
+              <a:buSzPts val="3300"/>
+              <a:buFont typeface="Quantico"/>
+              <a:buNone/>
+              <a:defRPr sz="3300" b="1" i="0" u="none" strike="noStrike" cap="none">
+                <a:solidFill>
+                  <a:schemeClr val="dk1"/>
+                </a:solidFill>
+                <a:latin typeface="Quantico"/>
+                <a:ea typeface="Quantico"/>
+                <a:cs typeface="Quantico"/>
+                <a:sym typeface="Quantico"/>
+              </a:defRPr>
+            </a:lvl5pPr>
+            <a:lvl6pPr marR="0" lvl="5" algn="l" rtl="0" eaLnBrk="1" hangingPunct="1">
+              <a:lnSpc>
+                <a:spcPct val="100000"/>
+              </a:lnSpc>
+              <a:spcBef>
+                <a:spcPts val="0"/>
+              </a:spcBef>
+              <a:spcAft>
+                <a:spcPts val="0"/>
+              </a:spcAft>
+              <a:buClr>
+                <a:schemeClr val="dk1"/>
+              </a:buClr>
+              <a:buSzPts val="3300"/>
+              <a:buFont typeface="Quantico"/>
+              <a:buNone/>
+              <a:defRPr sz="3300" b="1" i="0" u="none" strike="noStrike" cap="none">
+                <a:solidFill>
+                  <a:schemeClr val="dk1"/>
+                </a:solidFill>
+                <a:latin typeface="Quantico"/>
+                <a:ea typeface="Quantico"/>
+                <a:cs typeface="Quantico"/>
+                <a:sym typeface="Quantico"/>
+              </a:defRPr>
+            </a:lvl6pPr>
+            <a:lvl7pPr marR="0" lvl="6" algn="l" rtl="0" eaLnBrk="1" hangingPunct="1">
+              <a:lnSpc>
+                <a:spcPct val="100000"/>
+              </a:lnSpc>
+              <a:spcBef>
+                <a:spcPts val="0"/>
+              </a:spcBef>
+              <a:spcAft>
+                <a:spcPts val="0"/>
+              </a:spcAft>
+              <a:buClr>
+                <a:schemeClr val="dk1"/>
+              </a:buClr>
+              <a:buSzPts val="3300"/>
+              <a:buFont typeface="Quantico"/>
+              <a:buNone/>
+              <a:defRPr sz="3300" b="1" i="0" u="none" strike="noStrike" cap="none">
+                <a:solidFill>
+                  <a:schemeClr val="dk1"/>
+                </a:solidFill>
+                <a:latin typeface="Quantico"/>
+                <a:ea typeface="Quantico"/>
+                <a:cs typeface="Quantico"/>
+                <a:sym typeface="Quantico"/>
+              </a:defRPr>
+            </a:lvl7pPr>
+            <a:lvl8pPr marR="0" lvl="7" algn="l" rtl="0" eaLnBrk="1" hangingPunct="1">
+              <a:lnSpc>
+                <a:spcPct val="100000"/>
+              </a:lnSpc>
+              <a:spcBef>
+                <a:spcPts val="0"/>
+              </a:spcBef>
+              <a:spcAft>
+                <a:spcPts val="0"/>
+              </a:spcAft>
+              <a:buClr>
+                <a:schemeClr val="dk1"/>
+              </a:buClr>
+              <a:buSzPts val="3300"/>
+              <a:buFont typeface="Quantico"/>
+              <a:buNone/>
+              <a:defRPr sz="3300" b="1" i="0" u="none" strike="noStrike" cap="none">
+                <a:solidFill>
+                  <a:schemeClr val="dk1"/>
+                </a:solidFill>
+                <a:latin typeface="Quantico"/>
+                <a:ea typeface="Quantico"/>
+                <a:cs typeface="Quantico"/>
+                <a:sym typeface="Quantico"/>
+              </a:defRPr>
+            </a:lvl8pPr>
+            <a:lvl9pPr marR="0" lvl="8" algn="l" rtl="0" eaLnBrk="1" hangingPunct="1">
+              <a:lnSpc>
+                <a:spcPct val="100000"/>
+              </a:lnSpc>
+              <a:spcBef>
+                <a:spcPts val="0"/>
+              </a:spcBef>
+              <a:spcAft>
+                <a:spcPts val="0"/>
+              </a:spcAft>
+              <a:buClr>
+                <a:schemeClr val="dk1"/>
+              </a:buClr>
+              <a:buSzPts val="3300"/>
+              <a:buFont typeface="Quantico"/>
+              <a:buNone/>
+              <a:defRPr sz="3300" b="1" i="0" u="none" strike="noStrike" cap="none">
+                <a:solidFill>
+                  <a:schemeClr val="dk1"/>
+                </a:solidFill>
+                <a:latin typeface="Quantico"/>
+                <a:ea typeface="Quantico"/>
+                <a:cs typeface="Quantico"/>
+                <a:sym typeface="Quantico"/>
+              </a:defRPr>
+            </a:lvl9pPr>
+          </a:lstStyle>
+          <a:p>
+            <a:pPr algn="ctr"/>
+            <a:r>
+              <a:rPr lang="en-SE" dirty="0"/>
+              <a:t>IR code</a:t>
+            </a:r>
+          </a:p>
+        </p:txBody>
+      </p:sp>
+      <p:sp>
+        <p:nvSpPr>
+          <p:cNvPr id="15" name="Title 46">
+            <a:extLst>
+              <a:ext uri="{FF2B5EF4-FFF2-40B4-BE49-F238E27FC236}">
+                <a16:creationId xmlns:a16="http://schemas.microsoft.com/office/drawing/2014/main" id="{760AC13A-DF23-298C-C3D8-42B3F487FE38}"/>
+              </a:ext>
+            </a:extLst>
+          </p:cNvPr>
+          <p:cNvSpPr txBox="1">
+            <a:spLocks/>
+          </p:cNvSpPr>
+          <p:nvPr/>
+        </p:nvSpPr>
+        <p:spPr>
+          <a:xfrm>
+            <a:off x="4322531" y="3541005"/>
+            <a:ext cx="3430400" cy="768000"/>
+          </a:xfrm>
+          <a:prstGeom prst="rect">
+            <a:avLst/>
+          </a:prstGeom>
+          <a:noFill/>
+          <a:ln>
+            <a:noFill/>
+          </a:ln>
+        </p:spPr>
+        <p:txBody>
+          <a:bodyPr spcFirstLastPara="1" wrap="square" lIns="91425" tIns="91425" rIns="91425" bIns="91425" anchor="ctr" anchorCtr="0">
+            <a:noAutofit/>
+          </a:bodyPr>
+          <a:lstStyle>
+            <a:defPPr marR="0" lvl="0" algn="l" rtl="0">
+              <a:lnSpc>
+                <a:spcPct val="100000"/>
+              </a:lnSpc>
+              <a:spcBef>
+                <a:spcPts val="0"/>
+              </a:spcBef>
+              <a:spcAft>
+                <a:spcPts val="0"/>
+              </a:spcAft>
+            </a:defPPr>
+            <a:lvl1pPr marR="0" lvl="0" algn="l" rtl="0" eaLnBrk="1" hangingPunct="1">
+              <a:lnSpc>
+                <a:spcPct val="100000"/>
+              </a:lnSpc>
+              <a:spcBef>
+                <a:spcPts val="0"/>
+              </a:spcBef>
+              <a:spcAft>
+                <a:spcPts val="0"/>
+              </a:spcAft>
+              <a:buClr>
+                <a:schemeClr val="dk1"/>
+              </a:buClr>
+              <a:buSzPts val="3300"/>
+              <a:buFont typeface="Quantico"/>
+              <a:buNone/>
+              <a:defRPr sz="3300" b="0" i="0" u="none" strike="noStrike" cap="none">
+                <a:solidFill>
+                  <a:schemeClr val="dk1"/>
+                </a:solidFill>
+                <a:latin typeface="Quantico"/>
+                <a:ea typeface="Quantico"/>
+                <a:cs typeface="Quantico"/>
+                <a:sym typeface="Quantico"/>
+              </a:defRPr>
+            </a:lvl1pPr>
+            <a:lvl2pPr marR="0" lvl="1" algn="l" rtl="0" eaLnBrk="1" hangingPunct="1">
+              <a:lnSpc>
+                <a:spcPct val="100000"/>
+              </a:lnSpc>
+              <a:spcBef>
+                <a:spcPts val="0"/>
+              </a:spcBef>
+              <a:spcAft>
+                <a:spcPts val="0"/>
+              </a:spcAft>
+              <a:buClr>
+                <a:schemeClr val="dk1"/>
+              </a:buClr>
+              <a:buSzPts val="3300"/>
+              <a:buFont typeface="Quantico"/>
+              <a:buNone/>
+              <a:defRPr sz="3300" b="1" i="0" u="none" strike="noStrike" cap="none">
+                <a:solidFill>
+                  <a:schemeClr val="dk1"/>
+                </a:solidFill>
+                <a:latin typeface="Quantico"/>
+                <a:ea typeface="Quantico"/>
+                <a:cs typeface="Quantico"/>
+                <a:sym typeface="Quantico"/>
+              </a:defRPr>
+            </a:lvl2pPr>
+            <a:lvl3pPr marR="0" lvl="2" algn="l" rtl="0" eaLnBrk="1" hangingPunct="1">
+              <a:lnSpc>
+                <a:spcPct val="100000"/>
+              </a:lnSpc>
+              <a:spcBef>
+                <a:spcPts val="0"/>
+              </a:spcBef>
+              <a:spcAft>
+                <a:spcPts val="0"/>
+              </a:spcAft>
+              <a:buClr>
+                <a:schemeClr val="dk1"/>
+              </a:buClr>
+              <a:buSzPts val="3300"/>
+              <a:buFont typeface="Quantico"/>
+              <a:buNone/>
+              <a:defRPr sz="3300" b="1" i="0" u="none" strike="noStrike" cap="none">
+                <a:solidFill>
+                  <a:schemeClr val="dk1"/>
+                </a:solidFill>
+                <a:latin typeface="Quantico"/>
+                <a:ea typeface="Quantico"/>
+                <a:cs typeface="Quantico"/>
+                <a:sym typeface="Quantico"/>
+              </a:defRPr>
+            </a:lvl3pPr>
+            <a:lvl4pPr marR="0" lvl="3" algn="l" rtl="0" eaLnBrk="1" hangingPunct="1">
+              <a:lnSpc>
+                <a:spcPct val="100000"/>
+              </a:lnSpc>
+              <a:spcBef>
+                <a:spcPts val="0"/>
+              </a:spcBef>
+              <a:spcAft>
+                <a:spcPts val="0"/>
+              </a:spcAft>
+              <a:buClr>
+                <a:schemeClr val="dk1"/>
+              </a:buClr>
+              <a:buSzPts val="3300"/>
+              <a:buFont typeface="Quantico"/>
+              <a:buNone/>
+              <a:defRPr sz="3300" b="1" i="0" u="none" strike="noStrike" cap="none">
+                <a:solidFill>
+                  <a:schemeClr val="dk1"/>
+                </a:solidFill>
+                <a:latin typeface="Quantico"/>
+                <a:ea typeface="Quantico"/>
+                <a:cs typeface="Quantico"/>
+                <a:sym typeface="Quantico"/>
+              </a:defRPr>
+            </a:lvl4pPr>
+            <a:lvl5pPr marR="0" lvl="4" algn="l" rtl="0" eaLnBrk="1" hangingPunct="1">
+              <a:lnSpc>
+                <a:spcPct val="100000"/>
+              </a:lnSpc>
+              <a:spcBef>
+                <a:spcPts val="0"/>
+              </a:spcBef>
+              <a:spcAft>
+                <a:spcPts val="0"/>
+              </a:spcAft>
+              <a:buClr>
+                <a:schemeClr val="dk1"/>
+              </a:buClr>
+              <a:buSzPts val="3300"/>
+              <a:buFont typeface="Quantico"/>
+              <a:buNone/>
+              <a:defRPr sz="3300" b="1" i="0" u="none" strike="noStrike" cap="none">
+                <a:solidFill>
+                  <a:schemeClr val="dk1"/>
+                </a:solidFill>
+                <a:latin typeface="Quantico"/>
+                <a:ea typeface="Quantico"/>
+                <a:cs typeface="Quantico"/>
+                <a:sym typeface="Quantico"/>
+              </a:defRPr>
+            </a:lvl5pPr>
+            <a:lvl6pPr marR="0" lvl="5" algn="l" rtl="0" eaLnBrk="1" hangingPunct="1">
+              <a:lnSpc>
+                <a:spcPct val="100000"/>
+              </a:lnSpc>
+              <a:spcBef>
+                <a:spcPts val="0"/>
+              </a:spcBef>
+              <a:spcAft>
+                <a:spcPts val="0"/>
+              </a:spcAft>
+              <a:buClr>
+                <a:schemeClr val="dk1"/>
+              </a:buClr>
+              <a:buSzPts val="3300"/>
+              <a:buFont typeface="Quantico"/>
+              <a:buNone/>
+              <a:defRPr sz="3300" b="1" i="0" u="none" strike="noStrike" cap="none">
+                <a:solidFill>
+                  <a:schemeClr val="dk1"/>
+                </a:solidFill>
+                <a:latin typeface="Quantico"/>
+                <a:ea typeface="Quantico"/>
+                <a:cs typeface="Quantico"/>
+                <a:sym typeface="Quantico"/>
+              </a:defRPr>
+            </a:lvl6pPr>
+            <a:lvl7pPr marR="0" lvl="6" algn="l" rtl="0" eaLnBrk="1" hangingPunct="1">
+              <a:lnSpc>
+                <a:spcPct val="100000"/>
+              </a:lnSpc>
+              <a:spcBef>
+                <a:spcPts val="0"/>
+              </a:spcBef>
+              <a:spcAft>
+                <a:spcPts val="0"/>
+              </a:spcAft>
+              <a:buClr>
+                <a:schemeClr val="dk1"/>
+              </a:buClr>
+              <a:buSzPts val="3300"/>
+              <a:buFont typeface="Quantico"/>
+              <a:buNone/>
+              <a:defRPr sz="3300" b="1" i="0" u="none" strike="noStrike" cap="none">
+                <a:solidFill>
+                  <a:schemeClr val="dk1"/>
+                </a:solidFill>
+                <a:latin typeface="Quantico"/>
+                <a:ea typeface="Quantico"/>
+                <a:cs typeface="Quantico"/>
+                <a:sym typeface="Quantico"/>
+              </a:defRPr>
+            </a:lvl7pPr>
+            <a:lvl8pPr marR="0" lvl="7" algn="l" rtl="0" eaLnBrk="1" hangingPunct="1">
+              <a:lnSpc>
+                <a:spcPct val="100000"/>
+              </a:lnSpc>
+              <a:spcBef>
+                <a:spcPts val="0"/>
+              </a:spcBef>
+              <a:spcAft>
+                <a:spcPts val="0"/>
+              </a:spcAft>
+              <a:buClr>
+                <a:schemeClr val="dk1"/>
+              </a:buClr>
+              <a:buSzPts val="3300"/>
+              <a:buFont typeface="Quantico"/>
+              <a:buNone/>
+              <a:defRPr sz="3300" b="1" i="0" u="none" strike="noStrike" cap="none">
+                <a:solidFill>
+                  <a:schemeClr val="dk1"/>
+                </a:solidFill>
+                <a:latin typeface="Quantico"/>
+                <a:ea typeface="Quantico"/>
+                <a:cs typeface="Quantico"/>
+                <a:sym typeface="Quantico"/>
+              </a:defRPr>
+            </a:lvl8pPr>
+            <a:lvl9pPr marR="0" lvl="8" algn="l" rtl="0" eaLnBrk="1" hangingPunct="1">
+              <a:lnSpc>
+                <a:spcPct val="100000"/>
+              </a:lnSpc>
+              <a:spcBef>
+                <a:spcPts val="0"/>
+              </a:spcBef>
+              <a:spcAft>
+                <a:spcPts val="0"/>
+              </a:spcAft>
+              <a:buClr>
+                <a:schemeClr val="dk1"/>
+              </a:buClr>
+              <a:buSzPts val="3300"/>
+              <a:buFont typeface="Quantico"/>
+              <a:buNone/>
+              <a:defRPr sz="3300" b="1" i="0" u="none" strike="noStrike" cap="none">
+                <a:solidFill>
+                  <a:schemeClr val="dk1"/>
+                </a:solidFill>
+                <a:latin typeface="Quantico"/>
+                <a:ea typeface="Quantico"/>
+                <a:cs typeface="Quantico"/>
+                <a:sym typeface="Quantico"/>
+              </a:defRPr>
+            </a:lvl9pPr>
+          </a:lstStyle>
+          <a:p>
+            <a:pPr algn="ctr"/>
+            <a:r>
+              <a:rPr lang="en-SE" dirty="0"/>
+              <a:t>Other phases</a:t>
+            </a:r>
+          </a:p>
+        </p:txBody>
+      </p:sp>
+      <p:sp>
+        <p:nvSpPr>
+          <p:cNvPr id="16" name="Title 46">
+            <a:extLst>
+              <a:ext uri="{FF2B5EF4-FFF2-40B4-BE49-F238E27FC236}">
+                <a16:creationId xmlns:a16="http://schemas.microsoft.com/office/drawing/2014/main" id="{AE5452FF-8410-74F3-5B24-62C221AB187B}"/>
+              </a:ext>
+            </a:extLst>
+          </p:cNvPr>
+          <p:cNvSpPr txBox="1">
+            <a:spLocks/>
+          </p:cNvSpPr>
+          <p:nvPr/>
+        </p:nvSpPr>
+        <p:spPr>
+          <a:xfrm>
+            <a:off x="4322531" y="4597743"/>
+            <a:ext cx="3430400" cy="768000"/>
+          </a:xfrm>
+          <a:prstGeom prst="rect">
+            <a:avLst/>
+          </a:prstGeom>
+          <a:noFill/>
+          <a:ln>
+            <a:noFill/>
+          </a:ln>
+        </p:spPr>
+        <p:txBody>
+          <a:bodyPr spcFirstLastPara="1" wrap="square" lIns="91425" tIns="91425" rIns="91425" bIns="91425" anchor="ctr" anchorCtr="0">
+            <a:noAutofit/>
+          </a:bodyPr>
+          <a:lstStyle>
+            <a:defPPr marR="0" lvl="0" algn="l" rtl="0">
+              <a:lnSpc>
+                <a:spcPct val="100000"/>
+              </a:lnSpc>
+              <a:spcBef>
+                <a:spcPts val="0"/>
+              </a:spcBef>
+              <a:spcAft>
+                <a:spcPts val="0"/>
+              </a:spcAft>
+            </a:defPPr>
+            <a:lvl1pPr marR="0" lvl="0" algn="l" rtl="0" eaLnBrk="1" hangingPunct="1">
+              <a:lnSpc>
+                <a:spcPct val="100000"/>
+              </a:lnSpc>
+              <a:spcBef>
+                <a:spcPts val="0"/>
+              </a:spcBef>
+              <a:spcAft>
+                <a:spcPts val="0"/>
+              </a:spcAft>
+              <a:buClr>
+                <a:schemeClr val="dk1"/>
+              </a:buClr>
+              <a:buSzPts val="3300"/>
+              <a:buFont typeface="Quantico"/>
+              <a:buNone/>
+              <a:defRPr sz="3300" b="0" i="0" u="none" strike="noStrike" cap="none">
+                <a:solidFill>
+                  <a:schemeClr val="dk1"/>
+                </a:solidFill>
+                <a:latin typeface="Quantico"/>
+                <a:ea typeface="Quantico"/>
+                <a:cs typeface="Quantico"/>
+                <a:sym typeface="Quantico"/>
+              </a:defRPr>
+            </a:lvl1pPr>
+            <a:lvl2pPr marR="0" lvl="1" algn="l" rtl="0" eaLnBrk="1" hangingPunct="1">
+              <a:lnSpc>
+                <a:spcPct val="100000"/>
+              </a:lnSpc>
+              <a:spcBef>
+                <a:spcPts val="0"/>
+              </a:spcBef>
+              <a:spcAft>
+                <a:spcPts val="0"/>
+              </a:spcAft>
+              <a:buClr>
+                <a:schemeClr val="dk1"/>
+              </a:buClr>
+              <a:buSzPts val="3300"/>
+              <a:buFont typeface="Quantico"/>
+              <a:buNone/>
+              <a:defRPr sz="3300" b="1" i="0" u="none" strike="noStrike" cap="none">
+                <a:solidFill>
+                  <a:schemeClr val="dk1"/>
+                </a:solidFill>
+                <a:latin typeface="Quantico"/>
+                <a:ea typeface="Quantico"/>
+                <a:cs typeface="Quantico"/>
+                <a:sym typeface="Quantico"/>
+              </a:defRPr>
+            </a:lvl2pPr>
+            <a:lvl3pPr marR="0" lvl="2" algn="l" rtl="0" eaLnBrk="1" hangingPunct="1">
+              <a:lnSpc>
+                <a:spcPct val="100000"/>
+              </a:lnSpc>
+              <a:spcBef>
+                <a:spcPts val="0"/>
+              </a:spcBef>
+              <a:spcAft>
+                <a:spcPts val="0"/>
+              </a:spcAft>
+              <a:buClr>
+                <a:schemeClr val="dk1"/>
+              </a:buClr>
+              <a:buSzPts val="3300"/>
+              <a:buFont typeface="Quantico"/>
+              <a:buNone/>
+              <a:defRPr sz="3300" b="1" i="0" u="none" strike="noStrike" cap="none">
+                <a:solidFill>
+                  <a:schemeClr val="dk1"/>
+                </a:solidFill>
+                <a:latin typeface="Quantico"/>
+                <a:ea typeface="Quantico"/>
+                <a:cs typeface="Quantico"/>
+                <a:sym typeface="Quantico"/>
+              </a:defRPr>
+            </a:lvl3pPr>
+            <a:lvl4pPr marR="0" lvl="3" algn="l" rtl="0" eaLnBrk="1" hangingPunct="1">
+              <a:lnSpc>
+                <a:spcPct val="100000"/>
+              </a:lnSpc>
+              <a:spcBef>
+                <a:spcPts val="0"/>
+              </a:spcBef>
+              <a:spcAft>
+                <a:spcPts val="0"/>
+              </a:spcAft>
+              <a:buClr>
+                <a:schemeClr val="dk1"/>
+              </a:buClr>
+              <a:buSzPts val="3300"/>
+              <a:buFont typeface="Quantico"/>
+              <a:buNone/>
+              <a:defRPr sz="3300" b="1" i="0" u="none" strike="noStrike" cap="none">
+                <a:solidFill>
+                  <a:schemeClr val="dk1"/>
+                </a:solidFill>
+                <a:latin typeface="Quantico"/>
+                <a:ea typeface="Quantico"/>
+                <a:cs typeface="Quantico"/>
+                <a:sym typeface="Quantico"/>
+              </a:defRPr>
+            </a:lvl4pPr>
+            <a:lvl5pPr marR="0" lvl="4" algn="l" rtl="0" eaLnBrk="1" hangingPunct="1">
+              <a:lnSpc>
+                <a:spcPct val="100000"/>
+              </a:lnSpc>
+              <a:spcBef>
+                <a:spcPts val="0"/>
+              </a:spcBef>
+              <a:spcAft>
+                <a:spcPts val="0"/>
+              </a:spcAft>
+              <a:buClr>
+                <a:schemeClr val="dk1"/>
+              </a:buClr>
+              <a:buSzPts val="3300"/>
+              <a:buFont typeface="Quantico"/>
+              <a:buNone/>
+              <a:defRPr sz="3300" b="1" i="0" u="none" strike="noStrike" cap="none">
+                <a:solidFill>
+                  <a:schemeClr val="dk1"/>
+                </a:solidFill>
+                <a:latin typeface="Quantico"/>
+                <a:ea typeface="Quantico"/>
+                <a:cs typeface="Quantico"/>
+                <a:sym typeface="Quantico"/>
+              </a:defRPr>
+            </a:lvl5pPr>
+            <a:lvl6pPr marR="0" lvl="5" algn="l" rtl="0" eaLnBrk="1" hangingPunct="1">
+              <a:lnSpc>
+                <a:spcPct val="100000"/>
+              </a:lnSpc>
+              <a:spcBef>
+                <a:spcPts val="0"/>
+              </a:spcBef>
+              <a:spcAft>
+                <a:spcPts val="0"/>
+              </a:spcAft>
+              <a:buClr>
+                <a:schemeClr val="dk1"/>
+              </a:buClr>
+              <a:buSzPts val="3300"/>
+              <a:buFont typeface="Quantico"/>
+              <a:buNone/>
+              <a:defRPr sz="3300" b="1" i="0" u="none" strike="noStrike" cap="none">
+                <a:solidFill>
+                  <a:schemeClr val="dk1"/>
+                </a:solidFill>
+                <a:latin typeface="Quantico"/>
+                <a:ea typeface="Quantico"/>
+                <a:cs typeface="Quantico"/>
+                <a:sym typeface="Quantico"/>
+              </a:defRPr>
+            </a:lvl6pPr>
+            <a:lvl7pPr marR="0" lvl="6" algn="l" rtl="0" eaLnBrk="1" hangingPunct="1">
+              <a:lnSpc>
+                <a:spcPct val="100000"/>
+              </a:lnSpc>
+              <a:spcBef>
+                <a:spcPts val="0"/>
+              </a:spcBef>
+              <a:spcAft>
+                <a:spcPts val="0"/>
+              </a:spcAft>
+              <a:buClr>
+                <a:schemeClr val="dk1"/>
+              </a:buClr>
+              <a:buSzPts val="3300"/>
+              <a:buFont typeface="Quantico"/>
+              <a:buNone/>
+              <a:defRPr sz="3300" b="1" i="0" u="none" strike="noStrike" cap="none">
+                <a:solidFill>
+                  <a:schemeClr val="dk1"/>
+                </a:solidFill>
+                <a:latin typeface="Quantico"/>
+                <a:ea typeface="Quantico"/>
+                <a:cs typeface="Quantico"/>
+                <a:sym typeface="Quantico"/>
+              </a:defRPr>
+            </a:lvl7pPr>
+            <a:lvl8pPr marR="0" lvl="7" algn="l" rtl="0" eaLnBrk="1" hangingPunct="1">
+              <a:lnSpc>
+                <a:spcPct val="100000"/>
+              </a:lnSpc>
+              <a:spcBef>
+                <a:spcPts val="0"/>
+              </a:spcBef>
+              <a:spcAft>
+                <a:spcPts val="0"/>
+              </a:spcAft>
+              <a:buClr>
+                <a:schemeClr val="dk1"/>
+              </a:buClr>
+              <a:buSzPts val="3300"/>
+              <a:buFont typeface="Quantico"/>
+              <a:buNone/>
+              <a:defRPr sz="3300" b="1" i="0" u="none" strike="noStrike" cap="none">
+                <a:solidFill>
+                  <a:schemeClr val="dk1"/>
+                </a:solidFill>
+                <a:latin typeface="Quantico"/>
+                <a:ea typeface="Quantico"/>
+                <a:cs typeface="Quantico"/>
+                <a:sym typeface="Quantico"/>
+              </a:defRPr>
+            </a:lvl8pPr>
+            <a:lvl9pPr marR="0" lvl="8" algn="l" rtl="0" eaLnBrk="1" hangingPunct="1">
+              <a:lnSpc>
+                <a:spcPct val="100000"/>
+              </a:lnSpc>
+              <a:spcBef>
+                <a:spcPts val="0"/>
+              </a:spcBef>
+              <a:spcAft>
+                <a:spcPts val="0"/>
+              </a:spcAft>
+              <a:buClr>
+                <a:schemeClr val="dk1"/>
+              </a:buClr>
+              <a:buSzPts val="3300"/>
+              <a:buFont typeface="Quantico"/>
+              <a:buNone/>
+              <a:defRPr sz="3300" b="1" i="0" u="none" strike="noStrike" cap="none">
+                <a:solidFill>
+                  <a:schemeClr val="dk1"/>
+                </a:solidFill>
+                <a:latin typeface="Quantico"/>
+                <a:ea typeface="Quantico"/>
+                <a:cs typeface="Quantico"/>
+                <a:sym typeface="Quantico"/>
+              </a:defRPr>
+            </a:lvl9pPr>
+          </a:lstStyle>
+          <a:p>
+            <a:pPr algn="ctr"/>
+            <a:r>
+              <a:rPr lang="en-SE" dirty="0"/>
+              <a:t>Byte code Machine code</a:t>
+            </a:r>
+          </a:p>
+        </p:txBody>
+      </p:sp>
     </p:spTree>
     <p:extLst>
       <p:ext uri="{BB962C8B-B14F-4D97-AF65-F5344CB8AC3E}">
@@ -22359,13 +23732,13 @@
   <p:clrMapOvr>
     <a:masterClrMapping/>
   </p:clrMapOvr>
-  <mc:AlternateContent xmlns:mc="http://schemas.openxmlformats.org/markup-compatibility/2006">
-    <mc:Choice xmlns:p159="http://schemas.microsoft.com/office/powerpoint/2015/09/main" Requires="p159">
+  <mc:AlternateContent xmlns:mc="http://schemas.openxmlformats.org/markup-compatibility/2006" xmlns:p159="http://schemas.microsoft.com/office/powerpoint/2015/09/main">
+    <mc:Choice Requires="p159">
       <p:transition xmlns:p14="http://schemas.microsoft.com/office/powerpoint/2010/main" spd="slow" p14:dur="2000">
         <p159:morph option="byObject"/>
       </p:transition>
     </mc:Choice>
-    <mc:Fallback>
+    <mc:Fallback xmlns="">
       <p:transition spd="slow">
         <p:fade/>
       </p:transition>
@@ -22449,6 +23822,854 @@
                                   </p:childTnLst>
                                 </p:cTn>
                               </p:par>
+                              <p:par>
+                                <p:cTn id="9" presetID="12" presetClass="entr" presetSubtype="2" fill="hold" grpId="0" nodeType="withEffect">
+                                  <p:stCondLst>
+                                    <p:cond delay="0"/>
+                                  </p:stCondLst>
+                                  <p:childTnLst>
+                                    <p:set>
+                                      <p:cBhvr>
+                                        <p:cTn id="10" dur="1" fill="hold">
+                                          <p:stCondLst>
+                                            <p:cond delay="0"/>
+                                          </p:stCondLst>
+                                        </p:cTn>
+                                        <p:tgtEl>
+                                          <p:spTgt spid="24"/>
+                                        </p:tgtEl>
+                                        <p:attrNameLst>
+                                          <p:attrName>style.visibility</p:attrName>
+                                        </p:attrNameLst>
+                                      </p:cBhvr>
+                                      <p:to>
+                                        <p:strVal val="visible"/>
+                                      </p:to>
+                                    </p:set>
+                                    <p:anim calcmode="lin" valueType="num">
+                                      <p:cBhvr additive="base">
+                                        <p:cTn id="11" dur="500"/>
+                                        <p:tgtEl>
+                                          <p:spTgt spid="24"/>
+                                        </p:tgtEl>
+                                        <p:attrNameLst>
+                                          <p:attrName>ppt_x</p:attrName>
+                                        </p:attrNameLst>
+                                      </p:cBhvr>
+                                      <p:tavLst>
+                                        <p:tav tm="0">
+                                          <p:val>
+                                            <p:strVal val="#ppt_x+#ppt_w*1.125000"/>
+                                          </p:val>
+                                        </p:tav>
+                                        <p:tav tm="100000">
+                                          <p:val>
+                                            <p:strVal val="#ppt_x"/>
+                                          </p:val>
+                                        </p:tav>
+                                      </p:tavLst>
+                                    </p:anim>
+                                    <p:animEffect transition="in" filter="wipe(left)">
+                                      <p:cBhvr>
+                                        <p:cTn id="12" dur="500"/>
+                                        <p:tgtEl>
+                                          <p:spTgt spid="24"/>
+                                        </p:tgtEl>
+                                      </p:cBhvr>
+                                    </p:animEffect>
+                                  </p:childTnLst>
+                                </p:cTn>
+                              </p:par>
+                              <p:par>
+                                <p:cTn id="13" presetID="12" presetClass="entr" presetSubtype="2" fill="hold" grpId="0" nodeType="withEffect">
+                                  <p:stCondLst>
+                                    <p:cond delay="0"/>
+                                  </p:stCondLst>
+                                  <p:childTnLst>
+                                    <p:set>
+                                      <p:cBhvr>
+                                        <p:cTn id="14" dur="1" fill="hold">
+                                          <p:stCondLst>
+                                            <p:cond delay="0"/>
+                                          </p:stCondLst>
+                                        </p:cTn>
+                                        <p:tgtEl>
+                                          <p:spTgt spid="2"/>
+                                        </p:tgtEl>
+                                        <p:attrNameLst>
+                                          <p:attrName>style.visibility</p:attrName>
+                                        </p:attrNameLst>
+                                      </p:cBhvr>
+                                      <p:to>
+                                        <p:strVal val="visible"/>
+                                      </p:to>
+                                    </p:set>
+                                    <p:anim calcmode="lin" valueType="num">
+                                      <p:cBhvr additive="base">
+                                        <p:cTn id="15" dur="500"/>
+                                        <p:tgtEl>
+                                          <p:spTgt spid="2"/>
+                                        </p:tgtEl>
+                                        <p:attrNameLst>
+                                          <p:attrName>ppt_x</p:attrName>
+                                        </p:attrNameLst>
+                                      </p:cBhvr>
+                                      <p:tavLst>
+                                        <p:tav tm="0">
+                                          <p:val>
+                                            <p:strVal val="#ppt_x+#ppt_w*1.125000"/>
+                                          </p:val>
+                                        </p:tav>
+                                        <p:tav tm="100000">
+                                          <p:val>
+                                            <p:strVal val="#ppt_x"/>
+                                          </p:val>
+                                        </p:tav>
+                                      </p:tavLst>
+                                    </p:anim>
+                                    <p:animEffect transition="in" filter="wipe(left)">
+                                      <p:cBhvr>
+                                        <p:cTn id="16" dur="500"/>
+                                        <p:tgtEl>
+                                          <p:spTgt spid="2"/>
+                                        </p:tgtEl>
+                                      </p:cBhvr>
+                                    </p:animEffect>
+                                  </p:childTnLst>
+                                </p:cTn>
+                              </p:par>
+                              <p:par>
+                                <p:cTn id="17" presetID="12" presetClass="entr" presetSubtype="2" fill="hold" grpId="0" nodeType="withEffect">
+                                  <p:stCondLst>
+                                    <p:cond delay="0"/>
+                                  </p:stCondLst>
+                                  <p:childTnLst>
+                                    <p:set>
+                                      <p:cBhvr>
+                                        <p:cTn id="18" dur="1" fill="hold">
+                                          <p:stCondLst>
+                                            <p:cond delay="0"/>
+                                          </p:stCondLst>
+                                        </p:cTn>
+                                        <p:tgtEl>
+                                          <p:spTgt spid="5"/>
+                                        </p:tgtEl>
+                                        <p:attrNameLst>
+                                          <p:attrName>style.visibility</p:attrName>
+                                        </p:attrNameLst>
+                                      </p:cBhvr>
+                                      <p:to>
+                                        <p:strVal val="visible"/>
+                                      </p:to>
+                                    </p:set>
+                                    <p:anim calcmode="lin" valueType="num">
+                                      <p:cBhvr additive="base">
+                                        <p:cTn id="19" dur="500"/>
+                                        <p:tgtEl>
+                                          <p:spTgt spid="5"/>
+                                        </p:tgtEl>
+                                        <p:attrNameLst>
+                                          <p:attrName>ppt_x</p:attrName>
+                                        </p:attrNameLst>
+                                      </p:cBhvr>
+                                      <p:tavLst>
+                                        <p:tav tm="0">
+                                          <p:val>
+                                            <p:strVal val="#ppt_x+#ppt_w*1.125000"/>
+                                          </p:val>
+                                        </p:tav>
+                                        <p:tav tm="100000">
+                                          <p:val>
+                                            <p:strVal val="#ppt_x"/>
+                                          </p:val>
+                                        </p:tav>
+                                      </p:tavLst>
+                                    </p:anim>
+                                    <p:animEffect transition="in" filter="wipe(left)">
+                                      <p:cBhvr>
+                                        <p:cTn id="20" dur="500"/>
+                                        <p:tgtEl>
+                                          <p:spTgt spid="5"/>
+                                        </p:tgtEl>
+                                      </p:cBhvr>
+                                    </p:animEffect>
+                                  </p:childTnLst>
+                                </p:cTn>
+                              </p:par>
+                              <p:par>
+                                <p:cTn id="21" presetID="12" presetClass="entr" presetSubtype="2" fill="hold" grpId="0" nodeType="withEffect">
+                                  <p:stCondLst>
+                                    <p:cond delay="0"/>
+                                  </p:stCondLst>
+                                  <p:childTnLst>
+                                    <p:set>
+                                      <p:cBhvr>
+                                        <p:cTn id="22" dur="1" fill="hold">
+                                          <p:stCondLst>
+                                            <p:cond delay="0"/>
+                                          </p:stCondLst>
+                                        </p:cTn>
+                                        <p:tgtEl>
+                                          <p:spTgt spid="8"/>
+                                        </p:tgtEl>
+                                        <p:attrNameLst>
+                                          <p:attrName>style.visibility</p:attrName>
+                                        </p:attrNameLst>
+                                      </p:cBhvr>
+                                      <p:to>
+                                        <p:strVal val="visible"/>
+                                      </p:to>
+                                    </p:set>
+                                    <p:anim calcmode="lin" valueType="num">
+                                      <p:cBhvr additive="base">
+                                        <p:cTn id="23" dur="500"/>
+                                        <p:tgtEl>
+                                          <p:spTgt spid="8"/>
+                                        </p:tgtEl>
+                                        <p:attrNameLst>
+                                          <p:attrName>ppt_x</p:attrName>
+                                        </p:attrNameLst>
+                                      </p:cBhvr>
+                                      <p:tavLst>
+                                        <p:tav tm="0">
+                                          <p:val>
+                                            <p:strVal val="#ppt_x+#ppt_w*1.125000"/>
+                                          </p:val>
+                                        </p:tav>
+                                        <p:tav tm="100000">
+                                          <p:val>
+                                            <p:strVal val="#ppt_x"/>
+                                          </p:val>
+                                        </p:tav>
+                                      </p:tavLst>
+                                    </p:anim>
+                                    <p:animEffect transition="in" filter="wipe(left)">
+                                      <p:cBhvr>
+                                        <p:cTn id="24" dur="500"/>
+                                        <p:tgtEl>
+                                          <p:spTgt spid="8"/>
+                                        </p:tgtEl>
+                                      </p:cBhvr>
+                                    </p:animEffect>
+                                  </p:childTnLst>
+                                </p:cTn>
+                              </p:par>
+                            </p:childTnLst>
+                          </p:cTn>
+                        </p:par>
+                      </p:childTnLst>
+                    </p:cTn>
+                  </p:par>
+                  <p:par>
+                    <p:cTn id="25" fill="hold">
+                      <p:stCondLst>
+                        <p:cond delay="indefinite"/>
+                      </p:stCondLst>
+                      <p:childTnLst>
+                        <p:par>
+                          <p:cTn id="26" fill="hold">
+                            <p:stCondLst>
+                              <p:cond delay="0"/>
+                            </p:stCondLst>
+                            <p:childTnLst>
+                              <p:par>
+                                <p:cTn id="27" presetID="12" presetClass="entr" presetSubtype="8" fill="hold" nodeType="clickEffect">
+                                  <p:stCondLst>
+                                    <p:cond delay="0"/>
+                                  </p:stCondLst>
+                                  <p:childTnLst>
+                                    <p:set>
+                                      <p:cBhvr>
+                                        <p:cTn id="28" dur="1" fill="hold">
+                                          <p:stCondLst>
+                                            <p:cond delay="0"/>
+                                          </p:stCondLst>
+                                        </p:cTn>
+                                        <p:tgtEl>
+                                          <p:spTgt spid="20"/>
+                                        </p:tgtEl>
+                                        <p:attrNameLst>
+                                          <p:attrName>style.visibility</p:attrName>
+                                        </p:attrNameLst>
+                                      </p:cBhvr>
+                                      <p:to>
+                                        <p:strVal val="visible"/>
+                                      </p:to>
+                                    </p:set>
+                                    <p:anim calcmode="lin" valueType="num">
+                                      <p:cBhvr additive="base">
+                                        <p:cTn id="29" dur="500"/>
+                                        <p:tgtEl>
+                                          <p:spTgt spid="20"/>
+                                        </p:tgtEl>
+                                        <p:attrNameLst>
+                                          <p:attrName>ppt_x</p:attrName>
+                                        </p:attrNameLst>
+                                      </p:cBhvr>
+                                      <p:tavLst>
+                                        <p:tav tm="0">
+                                          <p:val>
+                                            <p:strVal val="#ppt_x-#ppt_w*1.125000"/>
+                                          </p:val>
+                                        </p:tav>
+                                        <p:tav tm="100000">
+                                          <p:val>
+                                            <p:strVal val="#ppt_x"/>
+                                          </p:val>
+                                        </p:tav>
+                                      </p:tavLst>
+                                    </p:anim>
+                                    <p:animEffect transition="in" filter="wipe(right)">
+                                      <p:cBhvr>
+                                        <p:cTn id="30" dur="500"/>
+                                        <p:tgtEl>
+                                          <p:spTgt spid="20"/>
+                                        </p:tgtEl>
+                                      </p:cBhvr>
+                                    </p:animEffect>
+                                  </p:childTnLst>
+                                </p:cTn>
+                              </p:par>
+                              <p:par>
+                                <p:cTn id="31" presetID="12" presetClass="entr" presetSubtype="8" fill="hold" grpId="0" nodeType="withEffect">
+                                  <p:stCondLst>
+                                    <p:cond delay="0"/>
+                                  </p:stCondLst>
+                                  <p:childTnLst>
+                                    <p:set>
+                                      <p:cBhvr>
+                                        <p:cTn id="32" dur="1" fill="hold">
+                                          <p:stCondLst>
+                                            <p:cond delay="0"/>
+                                          </p:stCondLst>
+                                        </p:cTn>
+                                        <p:tgtEl>
+                                          <p:spTgt spid="25"/>
+                                        </p:tgtEl>
+                                        <p:attrNameLst>
+                                          <p:attrName>style.visibility</p:attrName>
+                                        </p:attrNameLst>
+                                      </p:cBhvr>
+                                      <p:to>
+                                        <p:strVal val="visible"/>
+                                      </p:to>
+                                    </p:set>
+                                    <p:anim calcmode="lin" valueType="num">
+                                      <p:cBhvr additive="base">
+                                        <p:cTn id="33" dur="500"/>
+                                        <p:tgtEl>
+                                          <p:spTgt spid="25"/>
+                                        </p:tgtEl>
+                                        <p:attrNameLst>
+                                          <p:attrName>ppt_x</p:attrName>
+                                        </p:attrNameLst>
+                                      </p:cBhvr>
+                                      <p:tavLst>
+                                        <p:tav tm="0">
+                                          <p:val>
+                                            <p:strVal val="#ppt_x-#ppt_w*1.125000"/>
+                                          </p:val>
+                                        </p:tav>
+                                        <p:tav tm="100000">
+                                          <p:val>
+                                            <p:strVal val="#ppt_x"/>
+                                          </p:val>
+                                        </p:tav>
+                                      </p:tavLst>
+                                    </p:anim>
+                                    <p:animEffect transition="in" filter="wipe(right)">
+                                      <p:cBhvr>
+                                        <p:cTn id="34" dur="500"/>
+                                        <p:tgtEl>
+                                          <p:spTgt spid="25"/>
+                                        </p:tgtEl>
+                                      </p:cBhvr>
+                                    </p:animEffect>
+                                  </p:childTnLst>
+                                </p:cTn>
+                              </p:par>
+                              <p:par>
+                                <p:cTn id="35" presetID="12" presetClass="entr" presetSubtype="8" fill="hold" grpId="0" nodeType="withEffect">
+                                  <p:stCondLst>
+                                    <p:cond delay="0"/>
+                                  </p:stCondLst>
+                                  <p:childTnLst>
+                                    <p:set>
+                                      <p:cBhvr>
+                                        <p:cTn id="36" dur="1" fill="hold">
+                                          <p:stCondLst>
+                                            <p:cond delay="0"/>
+                                          </p:stCondLst>
+                                        </p:cTn>
+                                        <p:tgtEl>
+                                          <p:spTgt spid="3"/>
+                                        </p:tgtEl>
+                                        <p:attrNameLst>
+                                          <p:attrName>style.visibility</p:attrName>
+                                        </p:attrNameLst>
+                                      </p:cBhvr>
+                                      <p:to>
+                                        <p:strVal val="visible"/>
+                                      </p:to>
+                                    </p:set>
+                                    <p:anim calcmode="lin" valueType="num">
+                                      <p:cBhvr additive="base">
+                                        <p:cTn id="37" dur="500"/>
+                                        <p:tgtEl>
+                                          <p:spTgt spid="3"/>
+                                        </p:tgtEl>
+                                        <p:attrNameLst>
+                                          <p:attrName>ppt_x</p:attrName>
+                                        </p:attrNameLst>
+                                      </p:cBhvr>
+                                      <p:tavLst>
+                                        <p:tav tm="0">
+                                          <p:val>
+                                            <p:strVal val="#ppt_x-#ppt_w*1.125000"/>
+                                          </p:val>
+                                        </p:tav>
+                                        <p:tav tm="100000">
+                                          <p:val>
+                                            <p:strVal val="#ppt_x"/>
+                                          </p:val>
+                                        </p:tav>
+                                      </p:tavLst>
+                                    </p:anim>
+                                    <p:animEffect transition="in" filter="wipe(right)">
+                                      <p:cBhvr>
+                                        <p:cTn id="38" dur="500"/>
+                                        <p:tgtEl>
+                                          <p:spTgt spid="3"/>
+                                        </p:tgtEl>
+                                      </p:cBhvr>
+                                    </p:animEffect>
+                                  </p:childTnLst>
+                                </p:cTn>
+                              </p:par>
+                              <p:par>
+                                <p:cTn id="39" presetID="12" presetClass="entr" presetSubtype="8" fill="hold" grpId="0" nodeType="withEffect">
+                                  <p:stCondLst>
+                                    <p:cond delay="0"/>
+                                  </p:stCondLst>
+                                  <p:childTnLst>
+                                    <p:set>
+                                      <p:cBhvr>
+                                        <p:cTn id="40" dur="1" fill="hold">
+                                          <p:stCondLst>
+                                            <p:cond delay="0"/>
+                                          </p:stCondLst>
+                                        </p:cTn>
+                                        <p:tgtEl>
+                                          <p:spTgt spid="6"/>
+                                        </p:tgtEl>
+                                        <p:attrNameLst>
+                                          <p:attrName>style.visibility</p:attrName>
+                                        </p:attrNameLst>
+                                      </p:cBhvr>
+                                      <p:to>
+                                        <p:strVal val="visible"/>
+                                      </p:to>
+                                    </p:set>
+                                    <p:anim calcmode="lin" valueType="num">
+                                      <p:cBhvr additive="base">
+                                        <p:cTn id="41" dur="500"/>
+                                        <p:tgtEl>
+                                          <p:spTgt spid="6"/>
+                                        </p:tgtEl>
+                                        <p:attrNameLst>
+                                          <p:attrName>ppt_x</p:attrName>
+                                        </p:attrNameLst>
+                                      </p:cBhvr>
+                                      <p:tavLst>
+                                        <p:tav tm="0">
+                                          <p:val>
+                                            <p:strVal val="#ppt_x-#ppt_w*1.125000"/>
+                                          </p:val>
+                                        </p:tav>
+                                        <p:tav tm="100000">
+                                          <p:val>
+                                            <p:strVal val="#ppt_x"/>
+                                          </p:val>
+                                        </p:tav>
+                                      </p:tavLst>
+                                    </p:anim>
+                                    <p:animEffect transition="in" filter="wipe(right)">
+                                      <p:cBhvr>
+                                        <p:cTn id="42" dur="500"/>
+                                        <p:tgtEl>
+                                          <p:spTgt spid="6"/>
+                                        </p:tgtEl>
+                                      </p:cBhvr>
+                                    </p:animEffect>
+                                  </p:childTnLst>
+                                </p:cTn>
+                              </p:par>
+                              <p:par>
+                                <p:cTn id="43" presetID="12" presetClass="entr" presetSubtype="8" fill="hold" grpId="0" nodeType="withEffect">
+                                  <p:stCondLst>
+                                    <p:cond delay="0"/>
+                                  </p:stCondLst>
+                                  <p:childTnLst>
+                                    <p:set>
+                                      <p:cBhvr>
+                                        <p:cTn id="44" dur="1" fill="hold">
+                                          <p:stCondLst>
+                                            <p:cond delay="0"/>
+                                          </p:stCondLst>
+                                        </p:cTn>
+                                        <p:tgtEl>
+                                          <p:spTgt spid="9"/>
+                                        </p:tgtEl>
+                                        <p:attrNameLst>
+                                          <p:attrName>style.visibility</p:attrName>
+                                        </p:attrNameLst>
+                                      </p:cBhvr>
+                                      <p:to>
+                                        <p:strVal val="visible"/>
+                                      </p:to>
+                                    </p:set>
+                                    <p:anim calcmode="lin" valueType="num">
+                                      <p:cBhvr additive="base">
+                                        <p:cTn id="45" dur="500"/>
+                                        <p:tgtEl>
+                                          <p:spTgt spid="9"/>
+                                        </p:tgtEl>
+                                        <p:attrNameLst>
+                                          <p:attrName>ppt_x</p:attrName>
+                                        </p:attrNameLst>
+                                      </p:cBhvr>
+                                      <p:tavLst>
+                                        <p:tav tm="0">
+                                          <p:val>
+                                            <p:strVal val="#ppt_x-#ppt_w*1.125000"/>
+                                          </p:val>
+                                        </p:tav>
+                                        <p:tav tm="100000">
+                                          <p:val>
+                                            <p:strVal val="#ppt_x"/>
+                                          </p:val>
+                                        </p:tav>
+                                      </p:tavLst>
+                                    </p:anim>
+                                    <p:animEffect transition="in" filter="wipe(right)">
+                                      <p:cBhvr>
+                                        <p:cTn id="46" dur="500"/>
+                                        <p:tgtEl>
+                                          <p:spTgt spid="9"/>
+                                        </p:tgtEl>
+                                      </p:cBhvr>
+                                    </p:animEffect>
+                                  </p:childTnLst>
+                                </p:cTn>
+                              </p:par>
+                            </p:childTnLst>
+                          </p:cTn>
+                        </p:par>
+                      </p:childTnLst>
+                    </p:cTn>
+                  </p:par>
+                  <p:par>
+                    <p:cTn id="47" fill="hold">
+                      <p:stCondLst>
+                        <p:cond delay="indefinite"/>
+                      </p:stCondLst>
+                      <p:childTnLst>
+                        <p:par>
+                          <p:cTn id="48" fill="hold">
+                            <p:stCondLst>
+                              <p:cond delay="0"/>
+                            </p:stCondLst>
+                            <p:childTnLst>
+                              <p:par>
+                                <p:cTn id="49" presetID="12" presetClass="entr" presetSubtype="1" fill="hold" nodeType="clickEffect">
+                                  <p:stCondLst>
+                                    <p:cond delay="0"/>
+                                  </p:stCondLst>
+                                  <p:childTnLst>
+                                    <p:set>
+                                      <p:cBhvr>
+                                        <p:cTn id="50" dur="1" fill="hold">
+                                          <p:stCondLst>
+                                            <p:cond delay="0"/>
+                                          </p:stCondLst>
+                                        </p:cTn>
+                                        <p:tgtEl>
+                                          <p:spTgt spid="14"/>
+                                        </p:tgtEl>
+                                        <p:attrNameLst>
+                                          <p:attrName>style.visibility</p:attrName>
+                                        </p:attrNameLst>
+                                      </p:cBhvr>
+                                      <p:to>
+                                        <p:strVal val="visible"/>
+                                      </p:to>
+                                    </p:set>
+                                    <p:anim calcmode="lin" valueType="num">
+                                      <p:cBhvr additive="base">
+                                        <p:cTn id="51" dur="500"/>
+                                        <p:tgtEl>
+                                          <p:spTgt spid="14"/>
+                                        </p:tgtEl>
+                                        <p:attrNameLst>
+                                          <p:attrName>ppt_y</p:attrName>
+                                        </p:attrNameLst>
+                                      </p:cBhvr>
+                                      <p:tavLst>
+                                        <p:tav tm="0">
+                                          <p:val>
+                                            <p:strVal val="#ppt_y-#ppt_h*1.125000"/>
+                                          </p:val>
+                                        </p:tav>
+                                        <p:tav tm="100000">
+                                          <p:val>
+                                            <p:strVal val="#ppt_y"/>
+                                          </p:val>
+                                        </p:tav>
+                                      </p:tavLst>
+                                    </p:anim>
+                                    <p:animEffect transition="in" filter="wipe(down)">
+                                      <p:cBhvr>
+                                        <p:cTn id="52" dur="500"/>
+                                        <p:tgtEl>
+                                          <p:spTgt spid="14"/>
+                                        </p:tgtEl>
+                                      </p:cBhvr>
+                                    </p:animEffect>
+                                  </p:childTnLst>
+                                </p:cTn>
+                              </p:par>
+                              <p:par>
+                                <p:cTn id="53" presetID="12" presetClass="entr" presetSubtype="1" fill="hold" grpId="0" nodeType="withEffect">
+                                  <p:stCondLst>
+                                    <p:cond delay="0"/>
+                                  </p:stCondLst>
+                                  <p:childTnLst>
+                                    <p:set>
+                                      <p:cBhvr>
+                                        <p:cTn id="54" dur="1" fill="hold">
+                                          <p:stCondLst>
+                                            <p:cond delay="0"/>
+                                          </p:stCondLst>
+                                        </p:cTn>
+                                        <p:tgtEl>
+                                          <p:spTgt spid="11"/>
+                                        </p:tgtEl>
+                                        <p:attrNameLst>
+                                          <p:attrName>style.visibility</p:attrName>
+                                        </p:attrNameLst>
+                                      </p:cBhvr>
+                                      <p:to>
+                                        <p:strVal val="visible"/>
+                                      </p:to>
+                                    </p:set>
+                                    <p:anim calcmode="lin" valueType="num">
+                                      <p:cBhvr additive="base">
+                                        <p:cTn id="55" dur="500"/>
+                                        <p:tgtEl>
+                                          <p:spTgt spid="11"/>
+                                        </p:tgtEl>
+                                        <p:attrNameLst>
+                                          <p:attrName>ppt_y</p:attrName>
+                                        </p:attrNameLst>
+                                      </p:cBhvr>
+                                      <p:tavLst>
+                                        <p:tav tm="0">
+                                          <p:val>
+                                            <p:strVal val="#ppt_y-#ppt_h*1.125000"/>
+                                          </p:val>
+                                        </p:tav>
+                                        <p:tav tm="100000">
+                                          <p:val>
+                                            <p:strVal val="#ppt_y"/>
+                                          </p:val>
+                                        </p:tav>
+                                      </p:tavLst>
+                                    </p:anim>
+                                    <p:animEffect transition="in" filter="wipe(down)">
+                                      <p:cBhvr>
+                                        <p:cTn id="56" dur="500"/>
+                                        <p:tgtEl>
+                                          <p:spTgt spid="11"/>
+                                        </p:tgtEl>
+                                      </p:cBhvr>
+                                    </p:animEffect>
+                                  </p:childTnLst>
+                                </p:cTn>
+                              </p:par>
+                              <p:par>
+                                <p:cTn id="57" presetID="12" presetClass="entr" presetSubtype="1" fill="hold" grpId="0" nodeType="withEffect">
+                                  <p:stCondLst>
+                                    <p:cond delay="0"/>
+                                  </p:stCondLst>
+                                  <p:childTnLst>
+                                    <p:set>
+                                      <p:cBhvr>
+                                        <p:cTn id="58" dur="1" fill="hold">
+                                          <p:stCondLst>
+                                            <p:cond delay="0"/>
+                                          </p:stCondLst>
+                                        </p:cTn>
+                                        <p:tgtEl>
+                                          <p:spTgt spid="13"/>
+                                        </p:tgtEl>
+                                        <p:attrNameLst>
+                                          <p:attrName>style.visibility</p:attrName>
+                                        </p:attrNameLst>
+                                      </p:cBhvr>
+                                      <p:to>
+                                        <p:strVal val="visible"/>
+                                      </p:to>
+                                    </p:set>
+                                    <p:anim calcmode="lin" valueType="num">
+                                      <p:cBhvr additive="base">
+                                        <p:cTn id="59" dur="500"/>
+                                        <p:tgtEl>
+                                          <p:spTgt spid="13"/>
+                                        </p:tgtEl>
+                                        <p:attrNameLst>
+                                          <p:attrName>ppt_y</p:attrName>
+                                        </p:attrNameLst>
+                                      </p:cBhvr>
+                                      <p:tavLst>
+                                        <p:tav tm="0">
+                                          <p:val>
+                                            <p:strVal val="#ppt_y-#ppt_h*1.125000"/>
+                                          </p:val>
+                                        </p:tav>
+                                        <p:tav tm="100000">
+                                          <p:val>
+                                            <p:strVal val="#ppt_y"/>
+                                          </p:val>
+                                        </p:tav>
+                                      </p:tavLst>
+                                    </p:anim>
+                                    <p:animEffect transition="in" filter="wipe(down)">
+                                      <p:cBhvr>
+                                        <p:cTn id="60" dur="500"/>
+                                        <p:tgtEl>
+                                          <p:spTgt spid="13"/>
+                                        </p:tgtEl>
+                                      </p:cBhvr>
+                                    </p:animEffect>
+                                  </p:childTnLst>
+                                </p:cTn>
+                              </p:par>
+                              <p:par>
+                                <p:cTn id="61" presetID="12" presetClass="entr" presetSubtype="1" fill="hold" grpId="0" nodeType="withEffect">
+                                  <p:stCondLst>
+                                    <p:cond delay="0"/>
+                                  </p:stCondLst>
+                                  <p:childTnLst>
+                                    <p:set>
+                                      <p:cBhvr>
+                                        <p:cTn id="62" dur="1" fill="hold">
+                                          <p:stCondLst>
+                                            <p:cond delay="0"/>
+                                          </p:stCondLst>
+                                        </p:cTn>
+                                        <p:tgtEl>
+                                          <p:spTgt spid="15"/>
+                                        </p:tgtEl>
+                                        <p:attrNameLst>
+                                          <p:attrName>style.visibility</p:attrName>
+                                        </p:attrNameLst>
+                                      </p:cBhvr>
+                                      <p:to>
+                                        <p:strVal val="visible"/>
+                                      </p:to>
+                                    </p:set>
+                                    <p:anim calcmode="lin" valueType="num">
+                                      <p:cBhvr additive="base">
+                                        <p:cTn id="63" dur="500"/>
+                                        <p:tgtEl>
+                                          <p:spTgt spid="15"/>
+                                        </p:tgtEl>
+                                        <p:attrNameLst>
+                                          <p:attrName>ppt_y</p:attrName>
+                                        </p:attrNameLst>
+                                      </p:cBhvr>
+                                      <p:tavLst>
+                                        <p:tav tm="0">
+                                          <p:val>
+                                            <p:strVal val="#ppt_y-#ppt_h*1.125000"/>
+                                          </p:val>
+                                        </p:tav>
+                                        <p:tav tm="100000">
+                                          <p:val>
+                                            <p:strVal val="#ppt_y"/>
+                                          </p:val>
+                                        </p:tav>
+                                      </p:tavLst>
+                                    </p:anim>
+                                    <p:animEffect transition="in" filter="wipe(down)">
+                                      <p:cBhvr>
+                                        <p:cTn id="64" dur="500"/>
+                                        <p:tgtEl>
+                                          <p:spTgt spid="15"/>
+                                        </p:tgtEl>
+                                      </p:cBhvr>
+                                    </p:animEffect>
+                                  </p:childTnLst>
+                                </p:cTn>
+                              </p:par>
+                              <p:par>
+                                <p:cTn id="65" presetID="12" presetClass="entr" presetSubtype="1" fill="hold" grpId="0" nodeType="withEffect">
+                                  <p:stCondLst>
+                                    <p:cond delay="0"/>
+                                  </p:stCondLst>
+                                  <p:childTnLst>
+                                    <p:set>
+                                      <p:cBhvr>
+                                        <p:cTn id="66" dur="1" fill="hold">
+                                          <p:stCondLst>
+                                            <p:cond delay="0"/>
+                                          </p:stCondLst>
+                                        </p:cTn>
+                                        <p:tgtEl>
+                                          <p:spTgt spid="16"/>
+                                        </p:tgtEl>
+                                        <p:attrNameLst>
+                                          <p:attrName>style.visibility</p:attrName>
+                                        </p:attrNameLst>
+                                      </p:cBhvr>
+                                      <p:to>
+                                        <p:strVal val="visible"/>
+                                      </p:to>
+                                    </p:set>
+                                    <p:anim calcmode="lin" valueType="num">
+                                      <p:cBhvr additive="base">
+                                        <p:cTn id="67" dur="500"/>
+                                        <p:tgtEl>
+                                          <p:spTgt spid="16"/>
+                                        </p:tgtEl>
+                                        <p:attrNameLst>
+                                          <p:attrName>ppt_y</p:attrName>
+                                        </p:attrNameLst>
+                                      </p:cBhvr>
+                                      <p:tavLst>
+                                        <p:tav tm="0">
+                                          <p:val>
+                                            <p:strVal val="#ppt_y-#ppt_h*1.125000"/>
+                                          </p:val>
+                                        </p:tav>
+                                        <p:tav tm="100000">
+                                          <p:val>
+                                            <p:strVal val="#ppt_y"/>
+                                          </p:val>
+                                        </p:tav>
+                                      </p:tavLst>
+                                    </p:anim>
+                                    <p:animEffect transition="in" filter="wipe(down)">
+                                      <p:cBhvr>
+                                        <p:cTn id="68" dur="500"/>
+                                        <p:tgtEl>
+                                          <p:spTgt spid="16"/>
+                                        </p:tgtEl>
+                                      </p:cBhvr>
+                                    </p:animEffect>
+                                  </p:childTnLst>
+                                </p:cTn>
+                              </p:par>
                             </p:childTnLst>
                           </p:cTn>
                         </p:par>
@@ -22476,6 +24697,20 @@
         </p:cTn>
       </p:par>
     </p:tnLst>
+    <p:bldLst>
+      <p:bldP spid="25" grpId="0" animBg="1"/>
+      <p:bldP spid="24" grpId="0" animBg="1"/>
+      <p:bldP spid="2" grpId="0"/>
+      <p:bldP spid="3" grpId="0"/>
+      <p:bldP spid="5" grpId="0"/>
+      <p:bldP spid="6" grpId="0"/>
+      <p:bldP spid="8" grpId="0"/>
+      <p:bldP spid="9" grpId="0"/>
+      <p:bldP spid="11" grpId="0" animBg="1"/>
+      <p:bldP spid="13" grpId="0"/>
+      <p:bldP spid="15" grpId="0"/>
+      <p:bldP spid="16" grpId="0"/>
+    </p:bldLst>
   </p:timing>
 </p:sld>
 </file>
@@ -23402,13 +25637,13 @@
   <p:clrMapOvr>
     <a:masterClrMapping/>
   </p:clrMapOvr>
-  <mc:AlternateContent xmlns:mc="http://schemas.openxmlformats.org/markup-compatibility/2006">
-    <mc:Choice xmlns:p159="http://schemas.microsoft.com/office/powerpoint/2015/09/main" Requires="p159">
+  <mc:AlternateContent xmlns:mc="http://schemas.openxmlformats.org/markup-compatibility/2006" xmlns:p159="http://schemas.microsoft.com/office/powerpoint/2015/09/main">
+    <mc:Choice Requires="p159">
       <p:transition xmlns:p14="http://schemas.microsoft.com/office/powerpoint/2010/main" spd="slow" p14:dur="2000">
         <p159:morph option="byObject"/>
       </p:transition>
     </mc:Choice>
-    <mc:Fallback>
+    <mc:Fallback xmlns="">
       <p:transition spd="slow">
         <p:fade/>
       </p:transition>
@@ -24626,13 +26861,13 @@
   <p:clrMapOvr>
     <a:masterClrMapping/>
   </p:clrMapOvr>
-  <mc:AlternateContent xmlns:mc="http://schemas.openxmlformats.org/markup-compatibility/2006">
-    <mc:Choice xmlns:p159="http://schemas.microsoft.com/office/powerpoint/2015/09/main" Requires="p159">
+  <mc:AlternateContent xmlns:mc="http://schemas.openxmlformats.org/markup-compatibility/2006" xmlns:p159="http://schemas.microsoft.com/office/powerpoint/2015/09/main">
+    <mc:Choice Requires="p159">
       <p:transition xmlns:p14="http://schemas.microsoft.com/office/powerpoint/2010/main" spd="slow" p14:dur="2000">
         <p159:morph option="byObject"/>
       </p:transition>
     </mc:Choice>
-    <mc:Fallback>
+    <mc:Fallback xmlns="">
       <p:transition spd="slow">
         <p:fade/>
       </p:transition>
@@ -25910,13 +28145,13 @@
   <p:clrMapOvr>
     <a:masterClrMapping/>
   </p:clrMapOvr>
-  <mc:AlternateContent xmlns:mc="http://schemas.openxmlformats.org/markup-compatibility/2006">
-    <mc:Choice xmlns:p159="http://schemas.microsoft.com/office/powerpoint/2015/09/main" Requires="p159">
+  <mc:AlternateContent xmlns:mc="http://schemas.openxmlformats.org/markup-compatibility/2006" xmlns:p159="http://schemas.microsoft.com/office/powerpoint/2015/09/main">
+    <mc:Choice Requires="p159">
       <p:transition xmlns:p14="http://schemas.microsoft.com/office/powerpoint/2010/main" spd="slow" p14:dur="2000">
         <p159:morph option="byObject"/>
       </p:transition>
     </mc:Choice>
-    <mc:Fallback>
+    <mc:Fallback xmlns="">
       <p:transition spd="slow">
         <p:fade/>
       </p:transition>
@@ -26739,13 +28974,13 @@
   <p:clrMapOvr>
     <a:masterClrMapping/>
   </p:clrMapOvr>
-  <mc:AlternateContent xmlns:mc="http://schemas.openxmlformats.org/markup-compatibility/2006">
-    <mc:Choice xmlns:p159="http://schemas.microsoft.com/office/powerpoint/2015/09/main" Requires="p159">
+  <mc:AlternateContent xmlns:mc="http://schemas.openxmlformats.org/markup-compatibility/2006" xmlns:p159="http://schemas.microsoft.com/office/powerpoint/2015/09/main">
+    <mc:Choice Requires="p159">
       <p:transition xmlns:p14="http://schemas.microsoft.com/office/powerpoint/2010/main" spd="slow" p14:dur="2000">
         <p159:morph option="byObject"/>
       </p:transition>
     </mc:Choice>
-    <mc:Fallback>
+    <mc:Fallback xmlns="">
       <p:transition spd="slow">
         <p:fade/>
       </p:transition>
@@ -28160,13 +30395,13 @@
   <p:clrMapOvr>
     <a:masterClrMapping/>
   </p:clrMapOvr>
-  <mc:AlternateContent xmlns:mc="http://schemas.openxmlformats.org/markup-compatibility/2006">
-    <mc:Choice xmlns:p159="http://schemas.microsoft.com/office/powerpoint/2015/09/main" Requires="p159">
+  <mc:AlternateContent xmlns:mc="http://schemas.openxmlformats.org/markup-compatibility/2006" xmlns:p159="http://schemas.microsoft.com/office/powerpoint/2015/09/main">
+    <mc:Choice Requires="p159">
       <p:transition xmlns:p14="http://schemas.microsoft.com/office/powerpoint/2010/main" spd="slow" p14:dur="2000">
         <p159:morph option="byObject"/>
       </p:transition>
     </mc:Choice>
-    <mc:Fallback>
+    <mc:Fallback xmlns="">
       <p:transition spd="slow">
         <p:fade/>
       </p:transition>

</xml_diff>